<commit_message>
Mise à jour Brochage DMXTOMIDI Version L476RG
</commit_message>
<xml_diff>
--- a/Maquettes/Elec_Num_Emb/MIDI_DMX_L476/brochage_DMX_L476.pptx
+++ b/Maquettes/Elec_Num_Emb/MIDI_DMX_L476/brochage_DMX_L476.pptx
@@ -5,7 +5,7 @@
     <p:sldMasterId id="2147483648" r:id="rId1"/>
   </p:sldMasterIdLst>
   <p:notesMasterIdLst>
-    <p:notesMasterId r:id="rId10"/>
+    <p:notesMasterId r:id="rId9"/>
   </p:notesMasterIdLst>
   <p:sldIdLst>
     <p:sldId id="279" r:id="rId2"/>
@@ -15,7 +15,6 @@
     <p:sldId id="277" r:id="rId6"/>
     <p:sldId id="278" r:id="rId7"/>
     <p:sldId id="259" r:id="rId8"/>
-    <p:sldId id="287" r:id="rId9"/>
   </p:sldIdLst>
   <p:sldSz cx="12192000" cy="6858000"/>
   <p:notesSz cx="6858000" cy="9144000"/>
@@ -204,7 +203,7 @@
           <a:p>
             <a:fld id="{DAC67291-13FB-4A85-9B62-8BED92F848C0}" type="datetimeFigureOut">
               <a:rPr lang="fr-FR" smtClean="0"/>
-              <a:t>01/03/2023</a:t>
+              <a:t>07/03/2023</a:t>
             </a:fld>
             <a:endParaRPr lang="fr-FR"/>
           </a:p>
@@ -702,7 +701,7 @@
           <a:p>
             <a:fld id="{9F9D7BD0-09ED-4241-9B50-84DC221E5746}" type="datetimeFigureOut">
               <a:rPr lang="fr-FR" smtClean="0"/>
-              <a:t>01/03/2023</a:t>
+              <a:t>07/03/2023</a:t>
             </a:fld>
             <a:endParaRPr lang="fr-FR"/>
           </a:p>
@@ -900,7 +899,7 @@
           <a:p>
             <a:fld id="{9F9D7BD0-09ED-4241-9B50-84DC221E5746}" type="datetimeFigureOut">
               <a:rPr lang="fr-FR" smtClean="0"/>
-              <a:t>01/03/2023</a:t>
+              <a:t>07/03/2023</a:t>
             </a:fld>
             <a:endParaRPr lang="fr-FR"/>
           </a:p>
@@ -1108,7 +1107,7 @@
           <a:p>
             <a:fld id="{9F9D7BD0-09ED-4241-9B50-84DC221E5746}" type="datetimeFigureOut">
               <a:rPr lang="fr-FR" smtClean="0"/>
-              <a:t>01/03/2023</a:t>
+              <a:t>07/03/2023</a:t>
             </a:fld>
             <a:endParaRPr lang="fr-FR"/>
           </a:p>
@@ -1306,7 +1305,7 @@
           <a:p>
             <a:fld id="{9F9D7BD0-09ED-4241-9B50-84DC221E5746}" type="datetimeFigureOut">
               <a:rPr lang="fr-FR" smtClean="0"/>
-              <a:t>01/03/2023</a:t>
+              <a:t>07/03/2023</a:t>
             </a:fld>
             <a:endParaRPr lang="fr-FR"/>
           </a:p>
@@ -1581,7 +1580,7 @@
           <a:p>
             <a:fld id="{9F9D7BD0-09ED-4241-9B50-84DC221E5746}" type="datetimeFigureOut">
               <a:rPr lang="fr-FR" smtClean="0"/>
-              <a:t>01/03/2023</a:t>
+              <a:t>07/03/2023</a:t>
             </a:fld>
             <a:endParaRPr lang="fr-FR"/>
           </a:p>
@@ -1846,7 +1845,7 @@
           <a:p>
             <a:fld id="{9F9D7BD0-09ED-4241-9B50-84DC221E5746}" type="datetimeFigureOut">
               <a:rPr lang="fr-FR" smtClean="0"/>
-              <a:t>01/03/2023</a:t>
+              <a:t>07/03/2023</a:t>
             </a:fld>
             <a:endParaRPr lang="fr-FR"/>
           </a:p>
@@ -2258,7 +2257,7 @@
           <a:p>
             <a:fld id="{9F9D7BD0-09ED-4241-9B50-84DC221E5746}" type="datetimeFigureOut">
               <a:rPr lang="fr-FR" smtClean="0"/>
-              <a:t>01/03/2023</a:t>
+              <a:t>07/03/2023</a:t>
             </a:fld>
             <a:endParaRPr lang="fr-FR"/>
           </a:p>
@@ -2399,7 +2398,7 @@
           <a:p>
             <a:fld id="{9F9D7BD0-09ED-4241-9B50-84DC221E5746}" type="datetimeFigureOut">
               <a:rPr lang="fr-FR" smtClean="0"/>
-              <a:t>01/03/2023</a:t>
+              <a:t>07/03/2023</a:t>
             </a:fld>
             <a:endParaRPr lang="fr-FR"/>
           </a:p>
@@ -2512,7 +2511,7 @@
           <a:p>
             <a:fld id="{9F9D7BD0-09ED-4241-9B50-84DC221E5746}" type="datetimeFigureOut">
               <a:rPr lang="fr-FR" smtClean="0"/>
-              <a:t>01/03/2023</a:t>
+              <a:t>07/03/2023</a:t>
             </a:fld>
             <a:endParaRPr lang="fr-FR"/>
           </a:p>
@@ -2823,7 +2822,7 @@
           <a:p>
             <a:fld id="{9F9D7BD0-09ED-4241-9B50-84DC221E5746}" type="datetimeFigureOut">
               <a:rPr lang="fr-FR" smtClean="0"/>
-              <a:t>01/03/2023</a:t>
+              <a:t>07/03/2023</a:t>
             </a:fld>
             <a:endParaRPr lang="fr-FR"/>
           </a:p>
@@ -3111,7 +3110,7 @@
           <a:p>
             <a:fld id="{9F9D7BD0-09ED-4241-9B50-84DC221E5746}" type="datetimeFigureOut">
               <a:rPr lang="fr-FR" smtClean="0"/>
-              <a:t>01/03/2023</a:t>
+              <a:t>07/03/2023</a:t>
             </a:fld>
             <a:endParaRPr lang="fr-FR"/>
           </a:p>
@@ -3352,7 +3351,7 @@
           <a:p>
             <a:fld id="{9F9D7BD0-09ED-4241-9B50-84DC221E5746}" type="datetimeFigureOut">
               <a:rPr lang="fr-FR" smtClean="0"/>
-              <a:t>01/03/2023</a:t>
+              <a:t>07/03/2023</a:t>
             </a:fld>
             <a:endParaRPr lang="fr-FR"/>
           </a:p>
@@ -5875,7 +5874,7 @@
         <p:spPr>
           <a:xfrm>
             <a:off x="779319" y="1059242"/>
-            <a:ext cx="10058972" cy="369332"/>
+            <a:ext cx="8969187" cy="369332"/>
           </a:xfrm>
           <a:prstGeom prst="rect">
             <a:avLst/>
@@ -5894,7 +5893,24 @@
                   <a:srgbClr val="002060"/>
                 </a:solidFill>
               </a:rPr>
-              <a:t>Programme Nucléo DMX : https://os.mbed.com/teams/IOGS_France/code/Arts_DMX512_carteV3_IOGS/</a:t>
+              <a:t>Programme Nucléo DMX : </a:t>
+            </a:r>
+            <a:r>
+              <a:rPr lang="fr-FR" dirty="0">
+                <a:solidFill>
+                  <a:srgbClr val="002060"/>
+                </a:solidFill>
+                <a:hlinkClick r:id="rId2"/>
+              </a:rPr>
+              <a:t>https://github.com/jvillemejane/MIDI_TO_DMX</a:t>
+            </a:r>
+            <a:r>
+              <a:rPr lang="fr-FR" dirty="0">
+                <a:solidFill>
+                  <a:srgbClr val="002060"/>
+                </a:solidFill>
+              </a:rPr>
+              <a:t>  (librairie version 1)</a:t>
             </a:r>
           </a:p>
         </p:txBody>
@@ -6067,7 +6083,7 @@
           <p:nvPr/>
         </p:nvPicPr>
         <p:blipFill>
-          <a:blip r:embed="rId2"/>
+          <a:blip r:embed="rId3"/>
           <a:stretch>
             <a:fillRect/>
           </a:stretch>
@@ -6250,7 +6266,7 @@
           <p:nvPr/>
         </p:nvPicPr>
         <p:blipFill>
-          <a:blip r:embed="rId3"/>
+          <a:blip r:embed="rId4"/>
           <a:stretch>
             <a:fillRect/>
           </a:stretch>
@@ -8802,6 +8818,9 @@
           <a:prstGeom prst="roundRect">
             <a:avLst/>
           </a:prstGeom>
+          <a:solidFill>
+            <a:srgbClr val="A6A6A6"/>
+          </a:solidFill>
         </p:spPr>
         <p:style>
           <a:lnRef idx="2">
@@ -8852,7 +8871,7 @@
             <a:avLst/>
           </a:prstGeom>
           <a:solidFill>
-            <a:schemeClr val="accent2"/>
+            <a:srgbClr val="A6A6A6"/>
           </a:solidFill>
         </p:spPr>
         <p:style>
@@ -8903,6 +8922,9 @@
           <a:prstGeom prst="roundRect">
             <a:avLst/>
           </a:prstGeom>
+          <a:solidFill>
+            <a:srgbClr val="A6A6A6"/>
+          </a:solidFill>
         </p:spPr>
         <p:style>
           <a:lnRef idx="2">
@@ -8953,7 +8975,7 @@
             <a:avLst/>
           </a:prstGeom>
           <a:solidFill>
-            <a:schemeClr val="accent2"/>
+            <a:srgbClr val="A6A6A6"/>
           </a:solidFill>
         </p:spPr>
         <p:style>
@@ -9005,7 +9027,7 @@
             <a:avLst/>
           </a:prstGeom>
           <a:solidFill>
-            <a:schemeClr val="accent1"/>
+            <a:srgbClr val="A6A6A6"/>
           </a:solidFill>
         </p:spPr>
         <p:style>
@@ -9057,7 +9079,7 @@
             <a:avLst/>
           </a:prstGeom>
           <a:solidFill>
-            <a:schemeClr val="accent1"/>
+            <a:srgbClr val="A6A6A6"/>
           </a:solidFill>
         </p:spPr>
         <p:style>
@@ -9211,6 +9233,9 @@
           <a:prstGeom prst="roundRect">
             <a:avLst/>
           </a:prstGeom>
+          <a:solidFill>
+            <a:srgbClr val="A6A6A6"/>
+          </a:solidFill>
         </p:spPr>
         <p:style>
           <a:lnRef idx="2">
@@ -9260,6 +9285,9 @@
           <a:prstGeom prst="roundRect">
             <a:avLst/>
           </a:prstGeom>
+          <a:solidFill>
+            <a:srgbClr val="A6A6A6"/>
+          </a:solidFill>
         </p:spPr>
         <p:style>
           <a:lnRef idx="2">
@@ -9309,6 +9337,9 @@
           <a:prstGeom prst="roundRect">
             <a:avLst/>
           </a:prstGeom>
+          <a:solidFill>
+            <a:srgbClr val="A6A6A6"/>
+          </a:solidFill>
         </p:spPr>
         <p:style>
           <a:lnRef idx="2">
@@ -9358,6 +9389,9 @@
           <a:prstGeom prst="roundRect">
             <a:avLst/>
           </a:prstGeom>
+          <a:solidFill>
+            <a:srgbClr val="A6A6A6"/>
+          </a:solidFill>
         </p:spPr>
         <p:style>
           <a:lnRef idx="2">
@@ -9726,7 +9760,7 @@
             <a:avLst/>
           </a:prstGeom>
           <a:solidFill>
-            <a:schemeClr val="accent1"/>
+            <a:srgbClr val="A6A6A6"/>
           </a:solidFill>
         </p:spPr>
         <p:style>
@@ -9778,7 +9812,7 @@
             <a:avLst/>
           </a:prstGeom>
           <a:solidFill>
-            <a:schemeClr val="accent1"/>
+            <a:srgbClr val="A6A6A6"/>
           </a:solidFill>
         </p:spPr>
         <p:style>
@@ -9830,7 +9864,7 @@
             <a:avLst/>
           </a:prstGeom>
           <a:solidFill>
-            <a:schemeClr val="accent1"/>
+            <a:srgbClr val="A6A6A6"/>
           </a:solidFill>
         </p:spPr>
         <p:style>
@@ -13846,45 +13880,6 @@
       </p:cxnSp>
       <p:sp>
         <p:nvSpPr>
-          <p:cNvPr id="39" name="ZoneTexte 38">
-            <a:extLst>
-              <a:ext uri="{FF2B5EF4-FFF2-40B4-BE49-F238E27FC236}">
-                <a16:creationId xmlns:a16="http://schemas.microsoft.com/office/drawing/2014/main" id="{DBE71EB7-5919-44AF-9E3D-D19DCC7E43FA}"/>
-              </a:ext>
-            </a:extLst>
-          </p:cNvPr>
-          <p:cNvSpPr txBox="1"/>
-          <p:nvPr/>
-        </p:nvSpPr>
-        <p:spPr>
-          <a:xfrm>
-            <a:off x="779319" y="1059242"/>
-            <a:ext cx="10052560" cy="369332"/>
-          </a:xfrm>
-          <a:prstGeom prst="rect">
-            <a:avLst/>
-          </a:prstGeom>
-          <a:noFill/>
-        </p:spPr>
-        <p:txBody>
-          <a:bodyPr wrap="none" rtlCol="0">
-            <a:spAutoFit/>
-          </a:bodyPr>
-          <a:lstStyle/>
-          <a:p>
-            <a:r>
-              <a:rPr lang="fr-FR" dirty="0">
-                <a:solidFill>
-                  <a:srgbClr val="002060"/>
-                </a:solidFill>
-              </a:rPr>
-              <a:t>Programme Nucléo DMX : https://os.mbed.com/teams/IOGS_France/code/Arts_DMX512_carteV3_MIDI/</a:t>
-            </a:r>
-          </a:p>
-        </p:txBody>
-      </p:sp>
-      <p:sp>
-        <p:nvSpPr>
           <p:cNvPr id="42" name="Rectangle : coins arrondis 41">
             <a:extLst>
               <a:ext uri="{FF2B5EF4-FFF2-40B4-BE49-F238E27FC236}">
@@ -16979,20 +16974,22 @@
       </p:sp>
       <p:cxnSp>
         <p:nvCxnSpPr>
-          <p:cNvPr id="21" name="Connecteur droit 20">
-            <a:extLst>
-              <a:ext uri="{FF2B5EF4-FFF2-40B4-BE49-F238E27FC236}">
-                <a16:creationId xmlns:a16="http://schemas.microsoft.com/office/drawing/2014/main" id="{819D541D-B546-4141-B179-5C156243B3BC}"/>
-              </a:ext>
-            </a:extLst>
-          </p:cNvPr>
-          <p:cNvCxnSpPr/>
+          <p:cNvPr id="31" name="Connecteur droit 30">
+            <a:extLst>
+              <a:ext uri="{FF2B5EF4-FFF2-40B4-BE49-F238E27FC236}">
+                <a16:creationId xmlns:a16="http://schemas.microsoft.com/office/drawing/2014/main" id="{403E5D90-3502-4F6C-AD7A-7A4E01D26DE6}"/>
+              </a:ext>
+            </a:extLst>
+          </p:cNvPr>
+          <p:cNvCxnSpPr>
+            <a:cxnSpLocks/>
+          </p:cNvCxnSpPr>
           <p:nvPr/>
         </p:nvCxnSpPr>
         <p:spPr>
           <a:xfrm>
-            <a:off x="355107" y="1137427"/>
-            <a:ext cx="11558726" cy="0"/>
+            <a:off x="355107" y="754727"/>
+            <a:ext cx="7421732" cy="0"/>
           </a:xfrm>
           <a:prstGeom prst="line">
             <a:avLst/>
@@ -17018,49 +17015,6 @@
           </a:fontRef>
         </p:style>
       </p:cxnSp>
-      <p:cxnSp>
-        <p:nvCxnSpPr>
-          <p:cNvPr id="31" name="Connecteur droit 30">
-            <a:extLst>
-              <a:ext uri="{FF2B5EF4-FFF2-40B4-BE49-F238E27FC236}">
-                <a16:creationId xmlns:a16="http://schemas.microsoft.com/office/drawing/2014/main" id="{403E5D90-3502-4F6C-AD7A-7A4E01D26DE6}"/>
-              </a:ext>
-            </a:extLst>
-          </p:cNvPr>
-          <p:cNvCxnSpPr>
-            <a:cxnSpLocks/>
-          </p:cNvCxnSpPr>
-          <p:nvPr/>
-        </p:nvCxnSpPr>
-        <p:spPr>
-          <a:xfrm>
-            <a:off x="355107" y="754727"/>
-            <a:ext cx="7421732" cy="0"/>
-          </a:xfrm>
-          <a:prstGeom prst="line">
-            <a:avLst/>
-          </a:prstGeom>
-          <a:ln w="19050">
-            <a:solidFill>
-              <a:srgbClr val="002060"/>
-            </a:solidFill>
-          </a:ln>
-        </p:spPr>
-        <p:style>
-          <a:lnRef idx="1">
-            <a:schemeClr val="accent2"/>
-          </a:lnRef>
-          <a:fillRef idx="0">
-            <a:schemeClr val="accent2"/>
-          </a:fillRef>
-          <a:effectRef idx="0">
-            <a:schemeClr val="accent2"/>
-          </a:effectRef>
-          <a:fontRef idx="minor">
-            <a:schemeClr val="tx1"/>
-          </a:fontRef>
-        </p:style>
-      </p:cxnSp>
       <p:sp>
         <p:nvSpPr>
           <p:cNvPr id="42" name="Rectangle : coins arrondis 41">
@@ -17234,6 +17188,9 @@
           <a:prstGeom prst="roundRect">
             <a:avLst/>
           </a:prstGeom>
+          <a:solidFill>
+            <a:srgbClr val="A6A6A6"/>
+          </a:solidFill>
         </p:spPr>
         <p:style>
           <a:lnRef idx="2">
@@ -17335,6 +17292,9 @@
           <a:prstGeom prst="roundRect">
             <a:avLst/>
           </a:prstGeom>
+          <a:solidFill>
+            <a:srgbClr val="A6A6A6"/>
+          </a:solidFill>
         </p:spPr>
         <p:style>
           <a:lnRef idx="2">
@@ -17643,6 +17603,9 @@
           <a:prstGeom prst="roundRect">
             <a:avLst/>
           </a:prstGeom>
+          <a:solidFill>
+            <a:srgbClr val="A6A6A6"/>
+          </a:solidFill>
         </p:spPr>
         <p:style>
           <a:lnRef idx="2">
@@ -17692,6 +17655,9 @@
           <a:prstGeom prst="roundRect">
             <a:avLst/>
           </a:prstGeom>
+          <a:solidFill>
+            <a:srgbClr val="A6A6A6"/>
+          </a:solidFill>
         </p:spPr>
         <p:style>
           <a:lnRef idx="2">
@@ -17741,6 +17707,9 @@
           <a:prstGeom prst="roundRect">
             <a:avLst/>
           </a:prstGeom>
+          <a:solidFill>
+            <a:srgbClr val="A6A6A6"/>
+          </a:solidFill>
         </p:spPr>
         <p:style>
           <a:lnRef idx="2">
@@ -17790,6 +17759,9 @@
           <a:prstGeom prst="roundRect">
             <a:avLst/>
           </a:prstGeom>
+          <a:solidFill>
+            <a:srgbClr val="A6A6A6"/>
+          </a:solidFill>
         </p:spPr>
         <p:style>
           <a:lnRef idx="2">
@@ -22795,6 +22767,119 @@
           </a:p>
         </p:txBody>
       </p:sp>
+      <p:sp>
+        <p:nvSpPr>
+          <p:cNvPr id="4" name="ZoneTexte 3">
+            <a:extLst>
+              <a:ext uri="{FF2B5EF4-FFF2-40B4-BE49-F238E27FC236}">
+                <a16:creationId xmlns:a16="http://schemas.microsoft.com/office/drawing/2014/main" id="{CCBE2DB5-4CB4-83AD-DC13-52397636AC0C}"/>
+              </a:ext>
+            </a:extLst>
+          </p:cNvPr>
+          <p:cNvSpPr txBox="1"/>
+          <p:nvPr/>
+        </p:nvSpPr>
+        <p:spPr>
+          <a:xfrm>
+            <a:off x="779319" y="1059242"/>
+            <a:ext cx="9734203" cy="369332"/>
+          </a:xfrm>
+          <a:prstGeom prst="rect">
+            <a:avLst/>
+          </a:prstGeom>
+          <a:noFill/>
+        </p:spPr>
+        <p:txBody>
+          <a:bodyPr wrap="none" rtlCol="0">
+            <a:spAutoFit/>
+          </a:bodyPr>
+          <a:lstStyle/>
+          <a:p>
+            <a:r>
+              <a:rPr lang="fr-FR" dirty="0">
+                <a:solidFill>
+                  <a:srgbClr val="002060"/>
+                </a:solidFill>
+              </a:rPr>
+              <a:t>Programme </a:t>
+            </a:r>
+            <a:r>
+              <a:rPr lang="fr-FR">
+                <a:solidFill>
+                  <a:srgbClr val="002060"/>
+                </a:solidFill>
+              </a:rPr>
+              <a:t>Nucléo DMX et MIDI </a:t>
+            </a:r>
+            <a:r>
+              <a:rPr lang="fr-FR" dirty="0">
+                <a:solidFill>
+                  <a:srgbClr val="002060"/>
+                </a:solidFill>
+              </a:rPr>
+              <a:t>: </a:t>
+            </a:r>
+            <a:r>
+              <a:rPr lang="fr-FR" dirty="0">
+                <a:solidFill>
+                  <a:srgbClr val="002060"/>
+                </a:solidFill>
+                <a:hlinkClick r:id="rId2"/>
+              </a:rPr>
+              <a:t>https://github.com/jvillemejane/MIDI_TO_DMX</a:t>
+            </a:r>
+            <a:r>
+              <a:rPr lang="fr-FR" dirty="0">
+                <a:solidFill>
+                  <a:srgbClr val="002060"/>
+                </a:solidFill>
+              </a:rPr>
+              <a:t>  (librairie version 1)</a:t>
+            </a:r>
+          </a:p>
+        </p:txBody>
+      </p:sp>
+      <p:cxnSp>
+        <p:nvCxnSpPr>
+          <p:cNvPr id="5" name="Connecteur droit 4">
+            <a:extLst>
+              <a:ext uri="{FF2B5EF4-FFF2-40B4-BE49-F238E27FC236}">
+                <a16:creationId xmlns:a16="http://schemas.microsoft.com/office/drawing/2014/main" id="{0CDBD471-FF4A-C722-DF3F-75009BF52DF6}"/>
+              </a:ext>
+            </a:extLst>
+          </p:cNvPr>
+          <p:cNvCxnSpPr/>
+          <p:nvPr/>
+        </p:nvCxnSpPr>
+        <p:spPr>
+          <a:xfrm>
+            <a:off x="355107" y="1363758"/>
+            <a:ext cx="11558726" cy="0"/>
+          </a:xfrm>
+          <a:prstGeom prst="line">
+            <a:avLst/>
+          </a:prstGeom>
+          <a:ln w="19050">
+            <a:solidFill>
+              <a:srgbClr val="002060"/>
+            </a:solidFill>
+          </a:ln>
+        </p:spPr>
+        <p:style>
+          <a:lnRef idx="1">
+            <a:schemeClr val="accent2"/>
+          </a:lnRef>
+          <a:fillRef idx="0">
+            <a:schemeClr val="accent2"/>
+          </a:fillRef>
+          <a:effectRef idx="0">
+            <a:schemeClr val="accent2"/>
+          </a:effectRef>
+          <a:fontRef idx="minor">
+            <a:schemeClr val="tx1"/>
+          </a:fontRef>
+        </p:style>
+      </p:cxnSp>
     </p:spTree>
     <p:extLst>
       <p:ext uri="{BB962C8B-B14F-4D97-AF65-F5344CB8AC3E}">
@@ -24194,3371 +24279,6 @@
     <p:extLst>
       <p:ext uri="{BB962C8B-B14F-4D97-AF65-F5344CB8AC3E}">
         <p14:creationId xmlns:p14="http://schemas.microsoft.com/office/powerpoint/2010/main" val="4133601442"/>
-      </p:ext>
-    </p:extLst>
-  </p:cSld>
-  <p:clrMapOvr>
-    <a:masterClrMapping/>
-  </p:clrMapOvr>
-</p:sld>
-</file>
-
-<file path=ppt/slides/slide8.xml><?xml version="1.0" encoding="utf-8"?>
-<p:sld xmlns:a="http://schemas.openxmlformats.org/drawingml/2006/main" xmlns:r="http://schemas.openxmlformats.org/officeDocument/2006/relationships" xmlns:p="http://schemas.openxmlformats.org/presentationml/2006/main">
-  <p:cSld>
-    <p:spTree>
-      <p:nvGrpSpPr>
-        <p:cNvPr id="1" name=""/>
-        <p:cNvGrpSpPr/>
-        <p:nvPr/>
-      </p:nvGrpSpPr>
-      <p:grpSpPr>
-        <a:xfrm>
-          <a:off x="0" y="0"/>
-          <a:ext cx="0" cy="0"/>
-          <a:chOff x="0" y="0"/>
-          <a:chExt cx="0" cy="0"/>
-        </a:xfrm>
-      </p:grpSpPr>
-      <p:sp>
-        <p:nvSpPr>
-          <p:cNvPr id="26" name="Rectangle : coins arrondis 25">
-            <a:extLst>
-              <a:ext uri="{FF2B5EF4-FFF2-40B4-BE49-F238E27FC236}">
-                <a16:creationId xmlns:a16="http://schemas.microsoft.com/office/drawing/2014/main" id="{E05F433C-88A9-4BC2-A37E-A423DEAF4E69}"/>
-              </a:ext>
-            </a:extLst>
-          </p:cNvPr>
-          <p:cNvSpPr/>
-          <p:nvPr/>
-        </p:nvSpPr>
-        <p:spPr>
-          <a:xfrm>
-            <a:off x="428625" y="1603459"/>
-            <a:ext cx="922585" cy="3825966"/>
-          </a:xfrm>
-          <a:prstGeom prst="roundRect">
-            <a:avLst/>
-          </a:prstGeom>
-          <a:solidFill>
-            <a:schemeClr val="bg2"/>
-          </a:solidFill>
-        </p:spPr>
-        <p:style>
-          <a:lnRef idx="2">
-            <a:schemeClr val="accent1">
-              <a:shade val="50000"/>
-            </a:schemeClr>
-          </a:lnRef>
-          <a:fillRef idx="1">
-            <a:schemeClr val="accent1"/>
-          </a:fillRef>
-          <a:effectRef idx="0">
-            <a:schemeClr val="accent1"/>
-          </a:effectRef>
-          <a:fontRef idx="minor">
-            <a:schemeClr val="lt1"/>
-          </a:fontRef>
-        </p:style>
-        <p:txBody>
-          <a:bodyPr vert="vert270" rtlCol="0" anchor="ctr"/>
-          <a:lstStyle/>
-          <a:p>
-            <a:pPr algn="ctr"/>
-            <a:r>
-              <a:rPr lang="fr-FR" sz="2400" dirty="0" err="1">
-                <a:solidFill>
-                  <a:schemeClr val="bg1">
-                    <a:lumMod val="50000"/>
-                  </a:schemeClr>
-                </a:solidFill>
-              </a:rPr>
-              <a:t>Nucleo</a:t>
-            </a:r>
-            <a:r>
-              <a:rPr lang="fr-FR" sz="2400" dirty="0">
-                <a:solidFill>
-                  <a:schemeClr val="bg1">
-                    <a:lumMod val="50000"/>
-                  </a:schemeClr>
-                </a:solidFill>
-              </a:rPr>
-              <a:t> </a:t>
-            </a:r>
-            <a:r>
-              <a:rPr lang="fr-FR" sz="2400" dirty="0" err="1">
-                <a:solidFill>
-                  <a:schemeClr val="bg1">
-                    <a:lumMod val="50000"/>
-                  </a:schemeClr>
-                </a:solidFill>
-              </a:rPr>
-              <a:t>Board</a:t>
-            </a:r>
-            <a:endParaRPr lang="fr-FR" sz="2400" dirty="0">
-              <a:solidFill>
-                <a:schemeClr val="bg1">
-                  <a:lumMod val="50000"/>
-                </a:schemeClr>
-              </a:solidFill>
-            </a:endParaRPr>
-          </a:p>
-        </p:txBody>
-      </p:sp>
-      <p:sp>
-        <p:nvSpPr>
-          <p:cNvPr id="4" name="ZoneTexte 3">
-            <a:extLst>
-              <a:ext uri="{FF2B5EF4-FFF2-40B4-BE49-F238E27FC236}">
-                <a16:creationId xmlns:a16="http://schemas.microsoft.com/office/drawing/2014/main" id="{B99AC363-602C-462B-AB02-D3CE737EEB06}"/>
-              </a:ext>
-            </a:extLst>
-          </p:cNvPr>
-          <p:cNvSpPr txBox="1"/>
-          <p:nvPr/>
-        </p:nvSpPr>
-        <p:spPr>
-          <a:xfrm>
-            <a:off x="262934" y="173327"/>
-            <a:ext cx="5670270" cy="523220"/>
-          </a:xfrm>
-          <a:prstGeom prst="rect">
-            <a:avLst/>
-          </a:prstGeom>
-          <a:noFill/>
-        </p:spPr>
-        <p:txBody>
-          <a:bodyPr wrap="none" rtlCol="0">
-            <a:spAutoFit/>
-          </a:bodyPr>
-          <a:lstStyle/>
-          <a:p>
-            <a:r>
-              <a:rPr lang="fr-FR" sz="2800" b="1" dirty="0"/>
-              <a:t>DMX 512 / </a:t>
-            </a:r>
-            <a:r>
-              <a:rPr lang="fr-FR" b="1" dirty="0"/>
-              <a:t>carte L476 – révision 3 + extension MIDI</a:t>
-            </a:r>
-            <a:endParaRPr lang="fr-FR" sz="2800" b="1" dirty="0"/>
-          </a:p>
-        </p:txBody>
-      </p:sp>
-      <p:sp>
-        <p:nvSpPr>
-          <p:cNvPr id="75" name="ZoneTexte 74">
-            <a:extLst>
-              <a:ext uri="{FF2B5EF4-FFF2-40B4-BE49-F238E27FC236}">
-                <a16:creationId xmlns:a16="http://schemas.microsoft.com/office/drawing/2014/main" id="{9900FBC1-3C7F-495D-98E2-7B766A171227}"/>
-              </a:ext>
-            </a:extLst>
-          </p:cNvPr>
-          <p:cNvSpPr txBox="1"/>
-          <p:nvPr/>
-        </p:nvSpPr>
-        <p:spPr>
-          <a:xfrm>
-            <a:off x="9219040" y="173327"/>
-            <a:ext cx="2626731" cy="584775"/>
-          </a:xfrm>
-          <a:prstGeom prst="rect">
-            <a:avLst/>
-          </a:prstGeom>
-          <a:noFill/>
-        </p:spPr>
-        <p:txBody>
-          <a:bodyPr wrap="square" rtlCol="0">
-            <a:spAutoFit/>
-          </a:bodyPr>
-          <a:lstStyle/>
-          <a:p>
-            <a:pPr marL="285750" indent="-285750">
-              <a:buFontTx/>
-              <a:buChar char="-"/>
-            </a:pPr>
-            <a:r>
-              <a:rPr lang="fr-FR" sz="1600" b="1" dirty="0">
-                <a:solidFill>
-                  <a:schemeClr val="accent2"/>
-                </a:solidFill>
-              </a:rPr>
-              <a:t>Contrôleur de lumière</a:t>
-            </a:r>
-          </a:p>
-          <a:p>
-            <a:pPr marL="285750" indent="-285750">
-              <a:buFontTx/>
-              <a:buChar char="-"/>
-            </a:pPr>
-            <a:r>
-              <a:rPr lang="fr-FR" sz="1600" b="1" dirty="0">
-                <a:solidFill>
-                  <a:schemeClr val="accent2"/>
-                </a:solidFill>
-              </a:rPr>
-              <a:t>Communication RF</a:t>
-            </a:r>
-          </a:p>
-        </p:txBody>
-      </p:sp>
-      <p:cxnSp>
-        <p:nvCxnSpPr>
-          <p:cNvPr id="21" name="Connecteur droit 20">
-            <a:extLst>
-              <a:ext uri="{FF2B5EF4-FFF2-40B4-BE49-F238E27FC236}">
-                <a16:creationId xmlns:a16="http://schemas.microsoft.com/office/drawing/2014/main" id="{819D541D-B546-4141-B179-5C156243B3BC}"/>
-              </a:ext>
-            </a:extLst>
-          </p:cNvPr>
-          <p:cNvCxnSpPr/>
-          <p:nvPr/>
-        </p:nvCxnSpPr>
-        <p:spPr>
-          <a:xfrm>
-            <a:off x="355107" y="1363758"/>
-            <a:ext cx="11558726" cy="0"/>
-          </a:xfrm>
-          <a:prstGeom prst="line">
-            <a:avLst/>
-          </a:prstGeom>
-          <a:ln w="19050">
-            <a:solidFill>
-              <a:srgbClr val="002060"/>
-            </a:solidFill>
-          </a:ln>
-        </p:spPr>
-        <p:style>
-          <a:lnRef idx="1">
-            <a:schemeClr val="accent2"/>
-          </a:lnRef>
-          <a:fillRef idx="0">
-            <a:schemeClr val="accent2"/>
-          </a:fillRef>
-          <a:effectRef idx="0">
-            <a:schemeClr val="accent2"/>
-          </a:effectRef>
-          <a:fontRef idx="minor">
-            <a:schemeClr val="tx1"/>
-          </a:fontRef>
-        </p:style>
-      </p:cxnSp>
-      <p:sp>
-        <p:nvSpPr>
-          <p:cNvPr id="23" name="ZoneTexte 22">
-            <a:extLst>
-              <a:ext uri="{FF2B5EF4-FFF2-40B4-BE49-F238E27FC236}">
-                <a16:creationId xmlns:a16="http://schemas.microsoft.com/office/drawing/2014/main" id="{B1275299-DF0B-45A5-9802-401FA64072C2}"/>
-              </a:ext>
-            </a:extLst>
-          </p:cNvPr>
-          <p:cNvSpPr txBox="1"/>
-          <p:nvPr/>
-        </p:nvSpPr>
-        <p:spPr>
-          <a:xfrm>
-            <a:off x="262934" y="754727"/>
-            <a:ext cx="1476686" cy="369332"/>
-          </a:xfrm>
-          <a:prstGeom prst="rect">
-            <a:avLst/>
-          </a:prstGeom>
-          <a:noFill/>
-        </p:spPr>
-        <p:txBody>
-          <a:bodyPr wrap="none" rtlCol="0">
-            <a:spAutoFit/>
-          </a:bodyPr>
-          <a:lstStyle/>
-          <a:p>
-            <a:r>
-              <a:rPr lang="fr-FR" dirty="0">
-                <a:solidFill>
-                  <a:srgbClr val="002060"/>
-                </a:solidFill>
-              </a:rPr>
-              <a:t>A VERIFIER !!!</a:t>
-            </a:r>
-          </a:p>
-        </p:txBody>
-      </p:sp>
-      <p:cxnSp>
-        <p:nvCxnSpPr>
-          <p:cNvPr id="31" name="Connecteur droit 30">
-            <a:extLst>
-              <a:ext uri="{FF2B5EF4-FFF2-40B4-BE49-F238E27FC236}">
-                <a16:creationId xmlns:a16="http://schemas.microsoft.com/office/drawing/2014/main" id="{403E5D90-3502-4F6C-AD7A-7A4E01D26DE6}"/>
-              </a:ext>
-            </a:extLst>
-          </p:cNvPr>
-          <p:cNvCxnSpPr>
-            <a:cxnSpLocks/>
-          </p:cNvCxnSpPr>
-          <p:nvPr/>
-        </p:nvCxnSpPr>
-        <p:spPr>
-          <a:xfrm>
-            <a:off x="355107" y="754727"/>
-            <a:ext cx="7421732" cy="0"/>
-          </a:xfrm>
-          <a:prstGeom prst="line">
-            <a:avLst/>
-          </a:prstGeom>
-          <a:ln w="19050">
-            <a:solidFill>
-              <a:srgbClr val="002060"/>
-            </a:solidFill>
-          </a:ln>
-        </p:spPr>
-        <p:style>
-          <a:lnRef idx="1">
-            <a:schemeClr val="accent2"/>
-          </a:lnRef>
-          <a:fillRef idx="0">
-            <a:schemeClr val="accent2"/>
-          </a:fillRef>
-          <a:effectRef idx="0">
-            <a:schemeClr val="accent2"/>
-          </a:effectRef>
-          <a:fontRef idx="minor">
-            <a:schemeClr val="tx1"/>
-          </a:fontRef>
-        </p:style>
-      </p:cxnSp>
-      <p:sp>
-        <p:nvSpPr>
-          <p:cNvPr id="39" name="ZoneTexte 38">
-            <a:extLst>
-              <a:ext uri="{FF2B5EF4-FFF2-40B4-BE49-F238E27FC236}">
-                <a16:creationId xmlns:a16="http://schemas.microsoft.com/office/drawing/2014/main" id="{DBE71EB7-5919-44AF-9E3D-D19DCC7E43FA}"/>
-              </a:ext>
-            </a:extLst>
-          </p:cNvPr>
-          <p:cNvSpPr txBox="1"/>
-          <p:nvPr/>
-        </p:nvSpPr>
-        <p:spPr>
-          <a:xfrm>
-            <a:off x="779319" y="1059242"/>
-            <a:ext cx="10052560" cy="369332"/>
-          </a:xfrm>
-          <a:prstGeom prst="rect">
-            <a:avLst/>
-          </a:prstGeom>
-          <a:noFill/>
-        </p:spPr>
-        <p:txBody>
-          <a:bodyPr wrap="none" rtlCol="0">
-            <a:spAutoFit/>
-          </a:bodyPr>
-          <a:lstStyle/>
-          <a:p>
-            <a:r>
-              <a:rPr lang="fr-FR" dirty="0">
-                <a:solidFill>
-                  <a:srgbClr val="002060"/>
-                </a:solidFill>
-              </a:rPr>
-              <a:t>Programme Nucléo DMX : https://os.mbed.com/teams/IOGS_France/code/Arts_DMX512_carteV3_MIDI/</a:t>
-            </a:r>
-          </a:p>
-        </p:txBody>
-      </p:sp>
-      <p:sp>
-        <p:nvSpPr>
-          <p:cNvPr id="42" name="Rectangle : coins arrondis 41">
-            <a:extLst>
-              <a:ext uri="{FF2B5EF4-FFF2-40B4-BE49-F238E27FC236}">
-                <a16:creationId xmlns:a16="http://schemas.microsoft.com/office/drawing/2014/main" id="{134E98A0-C0B1-4598-9354-1E69A0310330}"/>
-              </a:ext>
-            </a:extLst>
-          </p:cNvPr>
-          <p:cNvSpPr/>
-          <p:nvPr/>
-        </p:nvSpPr>
-        <p:spPr>
-          <a:xfrm>
-            <a:off x="262934" y="5892290"/>
-            <a:ext cx="1579160" cy="210983"/>
-          </a:xfrm>
-          <a:prstGeom prst="roundRect">
-            <a:avLst/>
-          </a:prstGeom>
-        </p:spPr>
-        <p:style>
-          <a:lnRef idx="2">
-            <a:schemeClr val="accent1">
-              <a:shade val="50000"/>
-            </a:schemeClr>
-          </a:lnRef>
-          <a:fillRef idx="1">
-            <a:schemeClr val="accent1"/>
-          </a:fillRef>
-          <a:effectRef idx="0">
-            <a:schemeClr val="accent1"/>
-          </a:effectRef>
-          <a:fontRef idx="minor">
-            <a:schemeClr val="lt1"/>
-          </a:fontRef>
-        </p:style>
-        <p:txBody>
-          <a:bodyPr rtlCol="0" anchor="ctr"/>
-          <a:lstStyle/>
-          <a:p>
-            <a:pPr algn="ctr"/>
-            <a:r>
-              <a:rPr lang="fr-FR" sz="1000" dirty="0"/>
-              <a:t>Sortie Numérique</a:t>
-            </a:r>
-          </a:p>
-        </p:txBody>
-      </p:sp>
-      <p:sp>
-        <p:nvSpPr>
-          <p:cNvPr id="43" name="Rectangle : coins arrondis 42">
-            <a:extLst>
-              <a:ext uri="{FF2B5EF4-FFF2-40B4-BE49-F238E27FC236}">
-                <a16:creationId xmlns:a16="http://schemas.microsoft.com/office/drawing/2014/main" id="{5824E6DD-5797-4AAB-8A2D-F5A1D6988BBE}"/>
-              </a:ext>
-            </a:extLst>
-          </p:cNvPr>
-          <p:cNvSpPr/>
-          <p:nvPr/>
-        </p:nvSpPr>
-        <p:spPr>
-          <a:xfrm>
-            <a:off x="262934" y="6159992"/>
-            <a:ext cx="1579160" cy="210983"/>
-          </a:xfrm>
-          <a:prstGeom prst="roundRect">
-            <a:avLst/>
-          </a:prstGeom>
-          <a:solidFill>
-            <a:schemeClr val="accent2"/>
-          </a:solidFill>
-        </p:spPr>
-        <p:style>
-          <a:lnRef idx="2">
-            <a:schemeClr val="accent1">
-              <a:shade val="50000"/>
-            </a:schemeClr>
-          </a:lnRef>
-          <a:fillRef idx="1">
-            <a:schemeClr val="accent1"/>
-          </a:fillRef>
-          <a:effectRef idx="0">
-            <a:schemeClr val="accent1"/>
-          </a:effectRef>
-          <a:fontRef idx="minor">
-            <a:schemeClr val="lt1"/>
-          </a:fontRef>
-        </p:style>
-        <p:txBody>
-          <a:bodyPr rtlCol="0" anchor="ctr"/>
-          <a:lstStyle/>
-          <a:p>
-            <a:pPr algn="ctr"/>
-            <a:r>
-              <a:rPr lang="fr-FR" sz="1000" dirty="0"/>
-              <a:t>Entrée Numérique</a:t>
-            </a:r>
-          </a:p>
-        </p:txBody>
-      </p:sp>
-      <p:sp>
-        <p:nvSpPr>
-          <p:cNvPr id="44" name="Rectangle : coins arrondis 43">
-            <a:extLst>
-              <a:ext uri="{FF2B5EF4-FFF2-40B4-BE49-F238E27FC236}">
-                <a16:creationId xmlns:a16="http://schemas.microsoft.com/office/drawing/2014/main" id="{57A93C04-01D9-47C4-91CA-AFA7AED9953C}"/>
-              </a:ext>
-            </a:extLst>
-          </p:cNvPr>
-          <p:cNvSpPr/>
-          <p:nvPr/>
-        </p:nvSpPr>
-        <p:spPr>
-          <a:xfrm>
-            <a:off x="1240907" y="5107139"/>
-            <a:ext cx="854593" cy="149651"/>
-          </a:xfrm>
-          <a:prstGeom prst="roundRect">
-            <a:avLst/>
-          </a:prstGeom>
-        </p:spPr>
-        <p:style>
-          <a:lnRef idx="2">
-            <a:schemeClr val="accent1">
-              <a:shade val="50000"/>
-            </a:schemeClr>
-          </a:lnRef>
-          <a:fillRef idx="1">
-            <a:schemeClr val="accent1"/>
-          </a:fillRef>
-          <a:effectRef idx="0">
-            <a:schemeClr val="accent1"/>
-          </a:effectRef>
-          <a:fontRef idx="minor">
-            <a:schemeClr val="lt1"/>
-          </a:fontRef>
-        </p:style>
-        <p:txBody>
-          <a:bodyPr rtlCol="0" anchor="ctr"/>
-          <a:lstStyle/>
-          <a:p>
-            <a:pPr algn="ctr"/>
-            <a:r>
-              <a:rPr lang="fr-FR" sz="900" dirty="0"/>
-              <a:t>PC_10 / SCK</a:t>
-            </a:r>
-          </a:p>
-        </p:txBody>
-      </p:sp>
-      <p:sp>
-        <p:nvSpPr>
-          <p:cNvPr id="50" name="Rectangle : coins arrondis 49">
-            <a:extLst>
-              <a:ext uri="{FF2B5EF4-FFF2-40B4-BE49-F238E27FC236}">
-                <a16:creationId xmlns:a16="http://schemas.microsoft.com/office/drawing/2014/main" id="{DCA9E179-FAD4-47C8-BACD-7AA435C4043D}"/>
-              </a:ext>
-            </a:extLst>
-          </p:cNvPr>
-          <p:cNvSpPr/>
-          <p:nvPr/>
-        </p:nvSpPr>
-        <p:spPr>
-          <a:xfrm>
-            <a:off x="262934" y="6419748"/>
-            <a:ext cx="1579160" cy="210983"/>
-          </a:xfrm>
-          <a:prstGeom prst="roundRect">
-            <a:avLst/>
-          </a:prstGeom>
-          <a:solidFill>
-            <a:schemeClr val="accent6"/>
-          </a:solidFill>
-        </p:spPr>
-        <p:style>
-          <a:lnRef idx="2">
-            <a:schemeClr val="accent1">
-              <a:shade val="50000"/>
-            </a:schemeClr>
-          </a:lnRef>
-          <a:fillRef idx="1">
-            <a:schemeClr val="accent1"/>
-          </a:fillRef>
-          <a:effectRef idx="0">
-            <a:schemeClr val="accent1"/>
-          </a:effectRef>
-          <a:fontRef idx="minor">
-            <a:schemeClr val="lt1"/>
-          </a:fontRef>
-        </p:style>
-        <p:txBody>
-          <a:bodyPr rtlCol="0" anchor="ctr"/>
-          <a:lstStyle/>
-          <a:p>
-            <a:pPr algn="ctr"/>
-            <a:r>
-              <a:rPr lang="fr-FR" sz="1000" dirty="0"/>
-              <a:t>Entrée Analogique</a:t>
-            </a:r>
-          </a:p>
-        </p:txBody>
-      </p:sp>
-      <p:pic>
-        <p:nvPicPr>
-          <p:cNvPr id="3" name="Image 2">
-            <a:extLst>
-              <a:ext uri="{FF2B5EF4-FFF2-40B4-BE49-F238E27FC236}">
-                <a16:creationId xmlns:a16="http://schemas.microsoft.com/office/drawing/2014/main" id="{94EB09AD-A017-4363-AEE2-0D3303B8B9ED}"/>
-              </a:ext>
-            </a:extLst>
-          </p:cNvPr>
-          <p:cNvPicPr>
-            <a:picLocks noChangeAspect="1"/>
-          </p:cNvPicPr>
-          <p:nvPr/>
-        </p:nvPicPr>
-        <p:blipFill>
-          <a:blip r:embed="rId2"/>
-          <a:stretch>
-            <a:fillRect/>
-          </a:stretch>
-        </p:blipFill>
-        <p:spPr>
-          <a:xfrm>
-            <a:off x="5058907" y="1428573"/>
-            <a:ext cx="3867024" cy="5291314"/>
-          </a:xfrm>
-          <a:prstGeom prst="rect">
-            <a:avLst/>
-          </a:prstGeom>
-        </p:spPr>
-      </p:pic>
-      <p:sp>
-        <p:nvSpPr>
-          <p:cNvPr id="6" name="Rectangle 5">
-            <a:extLst>
-              <a:ext uri="{FF2B5EF4-FFF2-40B4-BE49-F238E27FC236}">
-                <a16:creationId xmlns:a16="http://schemas.microsoft.com/office/drawing/2014/main" id="{E4E76F4C-78C7-43B5-928E-BC47767505C5}"/>
-              </a:ext>
-            </a:extLst>
-          </p:cNvPr>
-          <p:cNvSpPr/>
-          <p:nvPr/>
-        </p:nvSpPr>
-        <p:spPr>
-          <a:xfrm>
-            <a:off x="5861500" y="5042517"/>
-            <a:ext cx="369365" cy="386910"/>
-          </a:xfrm>
-          <a:prstGeom prst="rect">
-            <a:avLst/>
-          </a:prstGeom>
-          <a:solidFill>
-            <a:schemeClr val="accent1">
-              <a:alpha val="50000"/>
-            </a:schemeClr>
-          </a:solidFill>
-        </p:spPr>
-        <p:style>
-          <a:lnRef idx="2">
-            <a:schemeClr val="accent1">
-              <a:shade val="50000"/>
-            </a:schemeClr>
-          </a:lnRef>
-          <a:fillRef idx="1">
-            <a:schemeClr val="accent1"/>
-          </a:fillRef>
-          <a:effectRef idx="0">
-            <a:schemeClr val="accent1"/>
-          </a:effectRef>
-          <a:fontRef idx="minor">
-            <a:schemeClr val="lt1"/>
-          </a:fontRef>
-        </p:style>
-        <p:txBody>
-          <a:bodyPr rtlCol="0" anchor="ctr"/>
-          <a:lstStyle/>
-          <a:p>
-            <a:pPr algn="ctr"/>
-            <a:endParaRPr lang="fr-FR"/>
-          </a:p>
-        </p:txBody>
-      </p:sp>
-      <p:sp>
-        <p:nvSpPr>
-          <p:cNvPr id="22" name="Rectangle 21">
-            <a:extLst>
-              <a:ext uri="{FF2B5EF4-FFF2-40B4-BE49-F238E27FC236}">
-                <a16:creationId xmlns:a16="http://schemas.microsoft.com/office/drawing/2014/main" id="{B0BFBE83-2195-4610-95A0-6E208C6169B6}"/>
-              </a:ext>
-            </a:extLst>
-          </p:cNvPr>
-          <p:cNvSpPr/>
-          <p:nvPr/>
-        </p:nvSpPr>
-        <p:spPr>
-          <a:xfrm>
-            <a:off x="6290049" y="5042517"/>
-            <a:ext cx="369365" cy="386910"/>
-          </a:xfrm>
-          <a:prstGeom prst="rect">
-            <a:avLst/>
-          </a:prstGeom>
-          <a:solidFill>
-            <a:schemeClr val="accent1">
-              <a:alpha val="50000"/>
-            </a:schemeClr>
-          </a:solidFill>
-        </p:spPr>
-        <p:style>
-          <a:lnRef idx="2">
-            <a:schemeClr val="accent1">
-              <a:shade val="50000"/>
-            </a:schemeClr>
-          </a:lnRef>
-          <a:fillRef idx="1">
-            <a:schemeClr val="accent1"/>
-          </a:fillRef>
-          <a:effectRef idx="0">
-            <a:schemeClr val="accent1"/>
-          </a:effectRef>
-          <a:fontRef idx="minor">
-            <a:schemeClr val="lt1"/>
-          </a:fontRef>
-        </p:style>
-        <p:txBody>
-          <a:bodyPr rtlCol="0" anchor="ctr"/>
-          <a:lstStyle/>
-          <a:p>
-            <a:pPr algn="ctr"/>
-            <a:endParaRPr lang="fr-FR"/>
-          </a:p>
-        </p:txBody>
-      </p:sp>
-      <p:sp>
-        <p:nvSpPr>
-          <p:cNvPr id="24" name="Rectangle 23">
-            <a:extLst>
-              <a:ext uri="{FF2B5EF4-FFF2-40B4-BE49-F238E27FC236}">
-                <a16:creationId xmlns:a16="http://schemas.microsoft.com/office/drawing/2014/main" id="{8D3043DA-5D58-4F29-B0AC-43B8DFD6082E}"/>
-              </a:ext>
-            </a:extLst>
-          </p:cNvPr>
-          <p:cNvSpPr/>
-          <p:nvPr/>
-        </p:nvSpPr>
-        <p:spPr>
-          <a:xfrm>
-            <a:off x="6718598" y="5042517"/>
-            <a:ext cx="369365" cy="386910"/>
-          </a:xfrm>
-          <a:prstGeom prst="rect">
-            <a:avLst/>
-          </a:prstGeom>
-          <a:solidFill>
-            <a:schemeClr val="accent1">
-              <a:alpha val="50000"/>
-            </a:schemeClr>
-          </a:solidFill>
-        </p:spPr>
-        <p:style>
-          <a:lnRef idx="2">
-            <a:schemeClr val="accent1">
-              <a:shade val="50000"/>
-            </a:schemeClr>
-          </a:lnRef>
-          <a:fillRef idx="1">
-            <a:schemeClr val="accent1"/>
-          </a:fillRef>
-          <a:effectRef idx="0">
-            <a:schemeClr val="accent1"/>
-          </a:effectRef>
-          <a:fontRef idx="minor">
-            <a:schemeClr val="lt1"/>
-          </a:fontRef>
-        </p:style>
-        <p:txBody>
-          <a:bodyPr rtlCol="0" anchor="ctr"/>
-          <a:lstStyle/>
-          <a:p>
-            <a:pPr algn="ctr"/>
-            <a:endParaRPr lang="fr-FR"/>
-          </a:p>
-        </p:txBody>
-      </p:sp>
-      <p:sp>
-        <p:nvSpPr>
-          <p:cNvPr id="27" name="Rectangle : coins arrondis 26">
-            <a:extLst>
-              <a:ext uri="{FF2B5EF4-FFF2-40B4-BE49-F238E27FC236}">
-                <a16:creationId xmlns:a16="http://schemas.microsoft.com/office/drawing/2014/main" id="{9D4A843D-8297-4576-89AA-61FC550ACB2B}"/>
-              </a:ext>
-            </a:extLst>
-          </p:cNvPr>
-          <p:cNvSpPr/>
-          <p:nvPr/>
-        </p:nvSpPr>
-        <p:spPr>
-          <a:xfrm>
-            <a:off x="3220569" y="3845346"/>
-            <a:ext cx="772357" cy="1582765"/>
-          </a:xfrm>
-          <a:prstGeom prst="roundRect">
-            <a:avLst/>
-          </a:prstGeom>
-          <a:solidFill>
-            <a:schemeClr val="accent5">
-              <a:lumMod val="20000"/>
-              <a:lumOff val="80000"/>
-            </a:schemeClr>
-          </a:solidFill>
-        </p:spPr>
-        <p:style>
-          <a:lnRef idx="2">
-            <a:schemeClr val="accent1">
-              <a:shade val="50000"/>
-            </a:schemeClr>
-          </a:lnRef>
-          <a:fillRef idx="1">
-            <a:schemeClr val="accent1"/>
-          </a:fillRef>
-          <a:effectRef idx="0">
-            <a:schemeClr val="accent1"/>
-          </a:effectRef>
-          <a:fontRef idx="minor">
-            <a:schemeClr val="lt1"/>
-          </a:fontRef>
-        </p:style>
-        <p:txBody>
-          <a:bodyPr vert="vert270" rtlCol="0" anchor="ctr"/>
-          <a:lstStyle/>
-          <a:p>
-            <a:pPr algn="ctr"/>
-            <a:r>
-              <a:rPr lang="fr-FR" dirty="0">
-                <a:solidFill>
-                  <a:schemeClr val="bg1">
-                    <a:lumMod val="50000"/>
-                  </a:schemeClr>
-                </a:solidFill>
-              </a:rPr>
-              <a:t>nRF24L01 / RF</a:t>
-            </a:r>
-          </a:p>
-        </p:txBody>
-      </p:sp>
-      <p:sp>
-        <p:nvSpPr>
-          <p:cNvPr id="29" name="Rectangle : coins arrondis 28">
-            <a:extLst>
-              <a:ext uri="{FF2B5EF4-FFF2-40B4-BE49-F238E27FC236}">
-                <a16:creationId xmlns:a16="http://schemas.microsoft.com/office/drawing/2014/main" id="{200EB79C-2348-490E-84E0-B7386096C5A4}"/>
-              </a:ext>
-            </a:extLst>
-          </p:cNvPr>
-          <p:cNvSpPr/>
-          <p:nvPr/>
-        </p:nvSpPr>
-        <p:spPr>
-          <a:xfrm>
-            <a:off x="2570008" y="5108134"/>
-            <a:ext cx="772357" cy="148656"/>
-          </a:xfrm>
-          <a:prstGeom prst="roundRect">
-            <a:avLst/>
-          </a:prstGeom>
-          <a:solidFill>
-            <a:schemeClr val="accent2"/>
-          </a:solidFill>
-        </p:spPr>
-        <p:style>
-          <a:lnRef idx="2">
-            <a:schemeClr val="accent1">
-              <a:shade val="50000"/>
-            </a:schemeClr>
-          </a:lnRef>
-          <a:fillRef idx="1">
-            <a:schemeClr val="accent1"/>
-          </a:fillRef>
-          <a:effectRef idx="0">
-            <a:schemeClr val="accent1"/>
-          </a:effectRef>
-          <a:fontRef idx="minor">
-            <a:schemeClr val="lt1"/>
-          </a:fontRef>
-        </p:style>
-        <p:txBody>
-          <a:bodyPr rtlCol="0" anchor="ctr"/>
-          <a:lstStyle/>
-          <a:p>
-            <a:pPr algn="ctr"/>
-            <a:r>
-              <a:rPr lang="fr-FR" sz="1100" dirty="0"/>
-              <a:t>CLK</a:t>
-            </a:r>
-          </a:p>
-        </p:txBody>
-      </p:sp>
-      <p:sp>
-        <p:nvSpPr>
-          <p:cNvPr id="30" name="Rectangle : coins arrondis 29">
-            <a:extLst>
-              <a:ext uri="{FF2B5EF4-FFF2-40B4-BE49-F238E27FC236}">
-                <a16:creationId xmlns:a16="http://schemas.microsoft.com/office/drawing/2014/main" id="{A3F1731C-5BA0-457A-A4CB-4F86E8D9B5AB}"/>
-              </a:ext>
-            </a:extLst>
-          </p:cNvPr>
-          <p:cNvSpPr/>
-          <p:nvPr/>
-        </p:nvSpPr>
-        <p:spPr>
-          <a:xfrm>
-            <a:off x="1240907" y="4901764"/>
-            <a:ext cx="854593" cy="148656"/>
-          </a:xfrm>
-          <a:prstGeom prst="roundRect">
-            <a:avLst/>
-          </a:prstGeom>
-        </p:spPr>
-        <p:style>
-          <a:lnRef idx="2">
-            <a:schemeClr val="accent1">
-              <a:shade val="50000"/>
-            </a:schemeClr>
-          </a:lnRef>
-          <a:fillRef idx="1">
-            <a:schemeClr val="accent1"/>
-          </a:fillRef>
-          <a:effectRef idx="0">
-            <a:schemeClr val="accent1"/>
-          </a:effectRef>
-          <a:fontRef idx="minor">
-            <a:schemeClr val="lt1"/>
-          </a:fontRef>
-        </p:style>
-        <p:txBody>
-          <a:bodyPr rtlCol="0" anchor="ctr"/>
-          <a:lstStyle/>
-          <a:p>
-            <a:pPr algn="ctr"/>
-            <a:r>
-              <a:rPr lang="fr-FR" sz="900" dirty="0"/>
-              <a:t>PC_12 / MOSI</a:t>
-            </a:r>
-          </a:p>
-        </p:txBody>
-      </p:sp>
-      <p:sp>
-        <p:nvSpPr>
-          <p:cNvPr id="32" name="Rectangle : coins arrondis 31">
-            <a:extLst>
-              <a:ext uri="{FF2B5EF4-FFF2-40B4-BE49-F238E27FC236}">
-                <a16:creationId xmlns:a16="http://schemas.microsoft.com/office/drawing/2014/main" id="{1B63043D-7862-46E4-97D5-1DAE9E58F74F}"/>
-              </a:ext>
-            </a:extLst>
-          </p:cNvPr>
-          <p:cNvSpPr/>
-          <p:nvPr/>
-        </p:nvSpPr>
-        <p:spPr>
-          <a:xfrm>
-            <a:off x="2570007" y="4906748"/>
-            <a:ext cx="772357" cy="148656"/>
-          </a:xfrm>
-          <a:prstGeom prst="roundRect">
-            <a:avLst/>
-          </a:prstGeom>
-          <a:solidFill>
-            <a:schemeClr val="accent2"/>
-          </a:solidFill>
-        </p:spPr>
-        <p:style>
-          <a:lnRef idx="2">
-            <a:schemeClr val="accent1">
-              <a:shade val="50000"/>
-            </a:schemeClr>
-          </a:lnRef>
-          <a:fillRef idx="1">
-            <a:schemeClr val="accent1"/>
-          </a:fillRef>
-          <a:effectRef idx="0">
-            <a:schemeClr val="accent1"/>
-          </a:effectRef>
-          <a:fontRef idx="minor">
-            <a:schemeClr val="lt1"/>
-          </a:fontRef>
-        </p:style>
-        <p:txBody>
-          <a:bodyPr rtlCol="0" anchor="ctr"/>
-          <a:lstStyle/>
-          <a:p>
-            <a:pPr algn="ctr"/>
-            <a:r>
-              <a:rPr lang="fr-FR" sz="1100" dirty="0"/>
-              <a:t>MOSI</a:t>
-            </a:r>
-          </a:p>
-        </p:txBody>
-      </p:sp>
-      <p:sp>
-        <p:nvSpPr>
-          <p:cNvPr id="33" name="Rectangle : coins arrondis 32">
-            <a:extLst>
-              <a:ext uri="{FF2B5EF4-FFF2-40B4-BE49-F238E27FC236}">
-                <a16:creationId xmlns:a16="http://schemas.microsoft.com/office/drawing/2014/main" id="{83F54CFF-52A9-4486-B8D0-FAE2429E2335}"/>
-              </a:ext>
-            </a:extLst>
-          </p:cNvPr>
-          <p:cNvSpPr/>
-          <p:nvPr/>
-        </p:nvSpPr>
-        <p:spPr>
-          <a:xfrm>
-            <a:off x="2570007" y="4693277"/>
-            <a:ext cx="772357" cy="148656"/>
-          </a:xfrm>
-          <a:prstGeom prst="roundRect">
-            <a:avLst/>
-          </a:prstGeom>
-          <a:solidFill>
-            <a:schemeClr val="accent1"/>
-          </a:solidFill>
-        </p:spPr>
-        <p:style>
-          <a:lnRef idx="2">
-            <a:schemeClr val="accent1">
-              <a:shade val="50000"/>
-            </a:schemeClr>
-          </a:lnRef>
-          <a:fillRef idx="1">
-            <a:schemeClr val="accent1"/>
-          </a:fillRef>
-          <a:effectRef idx="0">
-            <a:schemeClr val="accent1"/>
-          </a:effectRef>
-          <a:fontRef idx="minor">
-            <a:schemeClr val="lt1"/>
-          </a:fontRef>
-        </p:style>
-        <p:txBody>
-          <a:bodyPr rtlCol="0" anchor="ctr"/>
-          <a:lstStyle/>
-          <a:p>
-            <a:pPr algn="ctr"/>
-            <a:r>
-              <a:rPr lang="fr-FR" sz="1100" dirty="0"/>
-              <a:t>MISO</a:t>
-            </a:r>
-          </a:p>
-        </p:txBody>
-      </p:sp>
-      <p:sp>
-        <p:nvSpPr>
-          <p:cNvPr id="34" name="Rectangle : coins arrondis 33">
-            <a:extLst>
-              <a:ext uri="{FF2B5EF4-FFF2-40B4-BE49-F238E27FC236}">
-                <a16:creationId xmlns:a16="http://schemas.microsoft.com/office/drawing/2014/main" id="{008BF3C6-4A40-4324-8AA9-56CF9E0E945D}"/>
-              </a:ext>
-            </a:extLst>
-          </p:cNvPr>
-          <p:cNvSpPr/>
-          <p:nvPr/>
-        </p:nvSpPr>
-        <p:spPr>
-          <a:xfrm>
-            <a:off x="1240907" y="4696978"/>
-            <a:ext cx="854593" cy="148656"/>
-          </a:xfrm>
-          <a:prstGeom prst="roundRect">
-            <a:avLst/>
-          </a:prstGeom>
-          <a:solidFill>
-            <a:schemeClr val="accent2"/>
-          </a:solidFill>
-        </p:spPr>
-        <p:style>
-          <a:lnRef idx="2">
-            <a:schemeClr val="accent1">
-              <a:shade val="50000"/>
-            </a:schemeClr>
-          </a:lnRef>
-          <a:fillRef idx="1">
-            <a:schemeClr val="accent1"/>
-          </a:fillRef>
-          <a:effectRef idx="0">
-            <a:schemeClr val="accent1"/>
-          </a:effectRef>
-          <a:fontRef idx="minor">
-            <a:schemeClr val="lt1"/>
-          </a:fontRef>
-        </p:style>
-        <p:txBody>
-          <a:bodyPr rtlCol="0" anchor="ctr"/>
-          <a:lstStyle/>
-          <a:p>
-            <a:pPr algn="ctr"/>
-            <a:r>
-              <a:rPr lang="fr-FR" sz="900" dirty="0"/>
-              <a:t>PC_11 / MISO</a:t>
-            </a:r>
-          </a:p>
-        </p:txBody>
-      </p:sp>
-      <p:sp>
-        <p:nvSpPr>
-          <p:cNvPr id="36" name="Rectangle : coins arrondis 35">
-            <a:extLst>
-              <a:ext uri="{FF2B5EF4-FFF2-40B4-BE49-F238E27FC236}">
-                <a16:creationId xmlns:a16="http://schemas.microsoft.com/office/drawing/2014/main" id="{95F13365-2552-40ED-BB27-BFA7BBB220B5}"/>
-              </a:ext>
-            </a:extLst>
-          </p:cNvPr>
-          <p:cNvSpPr/>
-          <p:nvPr/>
-        </p:nvSpPr>
-        <p:spPr>
-          <a:xfrm>
-            <a:off x="2240444" y="4693277"/>
-            <a:ext cx="184619" cy="569212"/>
-          </a:xfrm>
-          <a:prstGeom prst="roundRect">
-            <a:avLst/>
-          </a:prstGeom>
-          <a:solidFill>
-            <a:schemeClr val="bg1"/>
-          </a:solidFill>
-          <a:ln>
-            <a:solidFill>
-              <a:schemeClr val="tx1"/>
-            </a:solidFill>
-          </a:ln>
-        </p:spPr>
-        <p:style>
-          <a:lnRef idx="2">
-            <a:schemeClr val="accent1">
-              <a:shade val="50000"/>
-            </a:schemeClr>
-          </a:lnRef>
-          <a:fillRef idx="1">
-            <a:schemeClr val="accent1"/>
-          </a:fillRef>
-          <a:effectRef idx="0">
-            <a:schemeClr val="accent1"/>
-          </a:effectRef>
-          <a:fontRef idx="minor">
-            <a:schemeClr val="lt1"/>
-          </a:fontRef>
-        </p:style>
-        <p:txBody>
-          <a:bodyPr vert="vert270" rtlCol="0" anchor="ctr"/>
-          <a:lstStyle/>
-          <a:p>
-            <a:pPr algn="ctr"/>
-            <a:r>
-              <a:rPr lang="fr-FR" sz="1400" dirty="0">
-                <a:solidFill>
-                  <a:schemeClr val="tx1"/>
-                </a:solidFill>
-              </a:rPr>
-              <a:t>SPI</a:t>
-            </a:r>
-          </a:p>
-        </p:txBody>
-      </p:sp>
-      <p:sp>
-        <p:nvSpPr>
-          <p:cNvPr id="37" name="Rectangle : coins arrondis 36">
-            <a:extLst>
-              <a:ext uri="{FF2B5EF4-FFF2-40B4-BE49-F238E27FC236}">
-                <a16:creationId xmlns:a16="http://schemas.microsoft.com/office/drawing/2014/main" id="{87F54A7E-2114-4BA8-9219-09FC6011E21A}"/>
-              </a:ext>
-            </a:extLst>
-          </p:cNvPr>
-          <p:cNvSpPr/>
-          <p:nvPr/>
-        </p:nvSpPr>
-        <p:spPr>
-          <a:xfrm>
-            <a:off x="1245650" y="4491891"/>
-            <a:ext cx="854593" cy="148656"/>
-          </a:xfrm>
-          <a:prstGeom prst="roundRect">
-            <a:avLst/>
-          </a:prstGeom>
-        </p:spPr>
-        <p:style>
-          <a:lnRef idx="2">
-            <a:schemeClr val="accent1">
-              <a:shade val="50000"/>
-            </a:schemeClr>
-          </a:lnRef>
-          <a:fillRef idx="1">
-            <a:schemeClr val="accent1"/>
-          </a:fillRef>
-          <a:effectRef idx="0">
-            <a:schemeClr val="accent1"/>
-          </a:effectRef>
-          <a:fontRef idx="minor">
-            <a:schemeClr val="lt1"/>
-          </a:fontRef>
-        </p:style>
-        <p:txBody>
-          <a:bodyPr rtlCol="0" anchor="ctr"/>
-          <a:lstStyle/>
-          <a:p>
-            <a:pPr algn="ctr"/>
-            <a:r>
-              <a:rPr lang="fr-FR" sz="900" dirty="0"/>
-              <a:t>PH_1</a:t>
-            </a:r>
-          </a:p>
-        </p:txBody>
-      </p:sp>
-      <p:sp>
-        <p:nvSpPr>
-          <p:cNvPr id="38" name="Rectangle : coins arrondis 37">
-            <a:extLst>
-              <a:ext uri="{FF2B5EF4-FFF2-40B4-BE49-F238E27FC236}">
-                <a16:creationId xmlns:a16="http://schemas.microsoft.com/office/drawing/2014/main" id="{F095FE00-4B71-4D7F-8C91-F610577745EE}"/>
-              </a:ext>
-            </a:extLst>
-          </p:cNvPr>
-          <p:cNvSpPr/>
-          <p:nvPr/>
-        </p:nvSpPr>
-        <p:spPr>
-          <a:xfrm>
-            <a:off x="2570007" y="4491891"/>
-            <a:ext cx="772357" cy="148656"/>
-          </a:xfrm>
-          <a:prstGeom prst="roundRect">
-            <a:avLst/>
-          </a:prstGeom>
-          <a:solidFill>
-            <a:schemeClr val="accent2"/>
-          </a:solidFill>
-        </p:spPr>
-        <p:style>
-          <a:lnRef idx="2">
-            <a:schemeClr val="accent1">
-              <a:shade val="50000"/>
-            </a:schemeClr>
-          </a:lnRef>
-          <a:fillRef idx="1">
-            <a:schemeClr val="accent1"/>
-          </a:fillRef>
-          <a:effectRef idx="0">
-            <a:schemeClr val="accent1"/>
-          </a:effectRef>
-          <a:fontRef idx="minor">
-            <a:schemeClr val="lt1"/>
-          </a:fontRef>
-        </p:style>
-        <p:txBody>
-          <a:bodyPr rtlCol="0" anchor="ctr"/>
-          <a:lstStyle/>
-          <a:p>
-            <a:pPr algn="ctr"/>
-            <a:r>
-              <a:rPr lang="fr-FR" sz="1100" dirty="0"/>
-              <a:t>CSN</a:t>
-            </a:r>
-          </a:p>
-        </p:txBody>
-      </p:sp>
-      <p:sp>
-        <p:nvSpPr>
-          <p:cNvPr id="40" name="Rectangle : coins arrondis 39">
-            <a:extLst>
-              <a:ext uri="{FF2B5EF4-FFF2-40B4-BE49-F238E27FC236}">
-                <a16:creationId xmlns:a16="http://schemas.microsoft.com/office/drawing/2014/main" id="{3F796F1C-A788-42B5-B8EF-CA6FD1A87536}"/>
-              </a:ext>
-            </a:extLst>
-          </p:cNvPr>
-          <p:cNvSpPr/>
-          <p:nvPr/>
-        </p:nvSpPr>
-        <p:spPr>
-          <a:xfrm>
-            <a:off x="2570007" y="4282044"/>
-            <a:ext cx="772357" cy="148656"/>
-          </a:xfrm>
-          <a:prstGeom prst="roundRect">
-            <a:avLst/>
-          </a:prstGeom>
-          <a:solidFill>
-            <a:schemeClr val="accent2"/>
-          </a:solidFill>
-        </p:spPr>
-        <p:style>
-          <a:lnRef idx="2">
-            <a:schemeClr val="accent1">
-              <a:shade val="50000"/>
-            </a:schemeClr>
-          </a:lnRef>
-          <a:fillRef idx="1">
-            <a:schemeClr val="accent1"/>
-          </a:fillRef>
-          <a:effectRef idx="0">
-            <a:schemeClr val="accent1"/>
-          </a:effectRef>
-          <a:fontRef idx="minor">
-            <a:schemeClr val="lt1"/>
-          </a:fontRef>
-        </p:style>
-        <p:txBody>
-          <a:bodyPr rtlCol="0" anchor="ctr"/>
-          <a:lstStyle/>
-          <a:p>
-            <a:pPr algn="ctr"/>
-            <a:r>
-              <a:rPr lang="fr-FR" sz="1100" dirty="0"/>
-              <a:t>CE</a:t>
-            </a:r>
-          </a:p>
-        </p:txBody>
-      </p:sp>
-      <p:sp>
-        <p:nvSpPr>
-          <p:cNvPr id="41" name="Rectangle : coins arrondis 40">
-            <a:extLst>
-              <a:ext uri="{FF2B5EF4-FFF2-40B4-BE49-F238E27FC236}">
-                <a16:creationId xmlns:a16="http://schemas.microsoft.com/office/drawing/2014/main" id="{29255274-C69B-4659-9327-332E2E61E093}"/>
-              </a:ext>
-            </a:extLst>
-          </p:cNvPr>
-          <p:cNvSpPr/>
-          <p:nvPr/>
-        </p:nvSpPr>
-        <p:spPr>
-          <a:xfrm>
-            <a:off x="1240907" y="4280292"/>
-            <a:ext cx="854593" cy="148656"/>
-          </a:xfrm>
-          <a:prstGeom prst="roundRect">
-            <a:avLst/>
-          </a:prstGeom>
-        </p:spPr>
-        <p:style>
-          <a:lnRef idx="2">
-            <a:schemeClr val="accent1">
-              <a:shade val="50000"/>
-            </a:schemeClr>
-          </a:lnRef>
-          <a:fillRef idx="1">
-            <a:schemeClr val="accent1"/>
-          </a:fillRef>
-          <a:effectRef idx="0">
-            <a:schemeClr val="accent1"/>
-          </a:effectRef>
-          <a:fontRef idx="minor">
-            <a:schemeClr val="lt1"/>
-          </a:fontRef>
-        </p:style>
-        <p:txBody>
-          <a:bodyPr rtlCol="0" anchor="ctr"/>
-          <a:lstStyle/>
-          <a:p>
-            <a:pPr algn="ctr"/>
-            <a:r>
-              <a:rPr lang="fr-FR" sz="900" dirty="0"/>
-              <a:t>PH_0</a:t>
-            </a:r>
-          </a:p>
-        </p:txBody>
-      </p:sp>
-      <p:sp>
-        <p:nvSpPr>
-          <p:cNvPr id="49" name="Rectangle : coins arrondis 48">
-            <a:extLst>
-              <a:ext uri="{FF2B5EF4-FFF2-40B4-BE49-F238E27FC236}">
-                <a16:creationId xmlns:a16="http://schemas.microsoft.com/office/drawing/2014/main" id="{C226F58E-3A7E-4F41-AF32-9D800F527484}"/>
-              </a:ext>
-            </a:extLst>
-          </p:cNvPr>
-          <p:cNvSpPr/>
-          <p:nvPr/>
-        </p:nvSpPr>
-        <p:spPr>
-          <a:xfrm>
-            <a:off x="1240906" y="4065384"/>
-            <a:ext cx="854593" cy="148656"/>
-          </a:xfrm>
-          <a:prstGeom prst="roundRect">
-            <a:avLst/>
-          </a:prstGeom>
-          <a:solidFill>
-            <a:schemeClr val="accent2"/>
-          </a:solidFill>
-        </p:spPr>
-        <p:style>
-          <a:lnRef idx="2">
-            <a:schemeClr val="accent1">
-              <a:shade val="50000"/>
-            </a:schemeClr>
-          </a:lnRef>
-          <a:fillRef idx="1">
-            <a:schemeClr val="accent1"/>
-          </a:fillRef>
-          <a:effectRef idx="0">
-            <a:schemeClr val="accent1"/>
-          </a:effectRef>
-          <a:fontRef idx="minor">
-            <a:schemeClr val="lt1"/>
-          </a:fontRef>
-        </p:style>
-        <p:txBody>
-          <a:bodyPr rtlCol="0" anchor="ctr"/>
-          <a:lstStyle/>
-          <a:p>
-            <a:pPr algn="ctr"/>
-            <a:r>
-              <a:rPr lang="fr-FR" sz="900" dirty="0"/>
-              <a:t>PD_2</a:t>
-            </a:r>
-          </a:p>
-        </p:txBody>
-      </p:sp>
-      <p:sp>
-        <p:nvSpPr>
-          <p:cNvPr id="52" name="Rectangle : coins arrondis 51">
-            <a:extLst>
-              <a:ext uri="{FF2B5EF4-FFF2-40B4-BE49-F238E27FC236}">
-                <a16:creationId xmlns:a16="http://schemas.microsoft.com/office/drawing/2014/main" id="{E70E144E-F0F4-4A82-9EB0-73E99AF700E6}"/>
-              </a:ext>
-            </a:extLst>
-          </p:cNvPr>
-          <p:cNvSpPr/>
-          <p:nvPr/>
-        </p:nvSpPr>
-        <p:spPr>
-          <a:xfrm>
-            <a:off x="2570006" y="4065092"/>
-            <a:ext cx="772357" cy="148656"/>
-          </a:xfrm>
-          <a:prstGeom prst="roundRect">
-            <a:avLst/>
-          </a:prstGeom>
-          <a:solidFill>
-            <a:schemeClr val="accent1"/>
-          </a:solidFill>
-        </p:spPr>
-        <p:style>
-          <a:lnRef idx="2">
-            <a:schemeClr val="accent1">
-              <a:shade val="50000"/>
-            </a:schemeClr>
-          </a:lnRef>
-          <a:fillRef idx="1">
-            <a:schemeClr val="accent1"/>
-          </a:fillRef>
-          <a:effectRef idx="0">
-            <a:schemeClr val="accent1"/>
-          </a:effectRef>
-          <a:fontRef idx="minor">
-            <a:schemeClr val="lt1"/>
-          </a:fontRef>
-        </p:style>
-        <p:txBody>
-          <a:bodyPr rtlCol="0" anchor="ctr"/>
-          <a:lstStyle/>
-          <a:p>
-            <a:pPr algn="ctr"/>
-            <a:r>
-              <a:rPr lang="fr-FR" sz="1100" dirty="0"/>
-              <a:t>IRQ</a:t>
-            </a:r>
-          </a:p>
-        </p:txBody>
-      </p:sp>
-      <p:pic>
-        <p:nvPicPr>
-          <p:cNvPr id="11" name="Image 10">
-            <a:extLst>
-              <a:ext uri="{FF2B5EF4-FFF2-40B4-BE49-F238E27FC236}">
-                <a16:creationId xmlns:a16="http://schemas.microsoft.com/office/drawing/2014/main" id="{2A7962CA-7A79-46C7-9E36-B3659E96FBFE}"/>
-              </a:ext>
-            </a:extLst>
-          </p:cNvPr>
-          <p:cNvPicPr>
-            <a:picLocks noChangeAspect="1"/>
-          </p:cNvPicPr>
-          <p:nvPr/>
-        </p:nvPicPr>
-        <p:blipFill>
-          <a:blip r:embed="rId3"/>
-          <a:stretch>
-            <a:fillRect/>
-          </a:stretch>
-        </p:blipFill>
-        <p:spPr>
-          <a:xfrm rot="5400000">
-            <a:off x="8930670" y="3707564"/>
-            <a:ext cx="4296692" cy="1409747"/>
-          </a:xfrm>
-          <a:prstGeom prst="rect">
-            <a:avLst/>
-          </a:prstGeom>
-        </p:spPr>
-      </p:pic>
-      <p:sp>
-        <p:nvSpPr>
-          <p:cNvPr id="63" name="ZoneTexte 62">
-            <a:extLst>
-              <a:ext uri="{FF2B5EF4-FFF2-40B4-BE49-F238E27FC236}">
-                <a16:creationId xmlns:a16="http://schemas.microsoft.com/office/drawing/2014/main" id="{B3601F2E-BE75-49BF-9E0A-E4290BD50FD0}"/>
-              </a:ext>
-            </a:extLst>
-          </p:cNvPr>
-          <p:cNvSpPr txBox="1"/>
-          <p:nvPr/>
-        </p:nvSpPr>
-        <p:spPr>
-          <a:xfrm>
-            <a:off x="10105273" y="1969415"/>
-            <a:ext cx="2162728" cy="276999"/>
-          </a:xfrm>
-          <a:prstGeom prst="rect">
-            <a:avLst/>
-          </a:prstGeom>
-          <a:noFill/>
-        </p:spPr>
-        <p:txBody>
-          <a:bodyPr wrap="square">
-            <a:spAutoFit/>
-          </a:bodyPr>
-          <a:lstStyle/>
-          <a:p>
-            <a:r>
-              <a:rPr lang="fr-FR" sz="1200" dirty="0"/>
-              <a:t>Génération du signal DMX</a:t>
-            </a:r>
-          </a:p>
-        </p:txBody>
-      </p:sp>
-      <p:sp>
-        <p:nvSpPr>
-          <p:cNvPr id="74" name="Rectangle 73">
-            <a:extLst>
-              <a:ext uri="{FF2B5EF4-FFF2-40B4-BE49-F238E27FC236}">
-                <a16:creationId xmlns:a16="http://schemas.microsoft.com/office/drawing/2014/main" id="{805FDC76-59C1-4C9C-A5D1-98FDA27CDB54}"/>
-              </a:ext>
-            </a:extLst>
-          </p:cNvPr>
-          <p:cNvSpPr/>
-          <p:nvPr/>
-        </p:nvSpPr>
-        <p:spPr>
-          <a:xfrm>
-            <a:off x="5306567" y="1603458"/>
-            <a:ext cx="554933" cy="464788"/>
-          </a:xfrm>
-          <a:prstGeom prst="rect">
-            <a:avLst/>
-          </a:prstGeom>
-          <a:solidFill>
-            <a:schemeClr val="accent1">
-              <a:alpha val="50000"/>
-            </a:schemeClr>
-          </a:solidFill>
-        </p:spPr>
-        <p:style>
-          <a:lnRef idx="2">
-            <a:schemeClr val="accent1">
-              <a:shade val="50000"/>
-            </a:schemeClr>
-          </a:lnRef>
-          <a:fillRef idx="1">
-            <a:schemeClr val="accent1"/>
-          </a:fillRef>
-          <a:effectRef idx="0">
-            <a:schemeClr val="accent1"/>
-          </a:effectRef>
-          <a:fontRef idx="minor">
-            <a:schemeClr val="lt1"/>
-          </a:fontRef>
-        </p:style>
-        <p:txBody>
-          <a:bodyPr rtlCol="0" anchor="ctr"/>
-          <a:lstStyle/>
-          <a:p>
-            <a:pPr algn="ctr"/>
-            <a:endParaRPr lang="fr-FR"/>
-          </a:p>
-        </p:txBody>
-      </p:sp>
-      <p:sp>
-        <p:nvSpPr>
-          <p:cNvPr id="56" name="Rectangle : coins arrondis 55">
-            <a:extLst>
-              <a:ext uri="{FF2B5EF4-FFF2-40B4-BE49-F238E27FC236}">
-                <a16:creationId xmlns:a16="http://schemas.microsoft.com/office/drawing/2014/main" id="{C7772A54-9C38-4C92-A5A6-BCA865DB1A49}"/>
-              </a:ext>
-            </a:extLst>
-          </p:cNvPr>
-          <p:cNvSpPr/>
-          <p:nvPr/>
-        </p:nvSpPr>
-        <p:spPr>
-          <a:xfrm rot="5400000">
-            <a:off x="5603947" y="4487316"/>
-            <a:ext cx="854593" cy="148656"/>
-          </a:xfrm>
-          <a:prstGeom prst="roundRect">
-            <a:avLst/>
-          </a:prstGeom>
-          <a:solidFill>
-            <a:schemeClr val="accent6"/>
-          </a:solidFill>
-        </p:spPr>
-        <p:style>
-          <a:lnRef idx="2">
-            <a:schemeClr val="accent1">
-              <a:shade val="50000"/>
-            </a:schemeClr>
-          </a:lnRef>
-          <a:fillRef idx="1">
-            <a:schemeClr val="accent1"/>
-          </a:fillRef>
-          <a:effectRef idx="0">
-            <a:schemeClr val="accent1"/>
-          </a:effectRef>
-          <a:fontRef idx="minor">
-            <a:schemeClr val="lt1"/>
-          </a:fontRef>
-        </p:style>
-        <p:txBody>
-          <a:bodyPr rtlCol="0" anchor="ctr"/>
-          <a:lstStyle/>
-          <a:p>
-            <a:pPr algn="ctr"/>
-            <a:r>
-              <a:rPr lang="fr-FR" sz="900" dirty="0"/>
-              <a:t>Pot. Rouge</a:t>
-            </a:r>
-          </a:p>
-        </p:txBody>
-      </p:sp>
-      <p:sp>
-        <p:nvSpPr>
-          <p:cNvPr id="76" name="Rectangle : coins arrondis 75">
-            <a:extLst>
-              <a:ext uri="{FF2B5EF4-FFF2-40B4-BE49-F238E27FC236}">
-                <a16:creationId xmlns:a16="http://schemas.microsoft.com/office/drawing/2014/main" id="{87268618-1236-4966-917E-7C1D3748CD3E}"/>
-              </a:ext>
-            </a:extLst>
-          </p:cNvPr>
-          <p:cNvSpPr/>
-          <p:nvPr/>
-        </p:nvSpPr>
-        <p:spPr>
-          <a:xfrm rot="5400000">
-            <a:off x="6486203" y="4499755"/>
-            <a:ext cx="854593" cy="148656"/>
-          </a:xfrm>
-          <a:prstGeom prst="roundRect">
-            <a:avLst/>
-          </a:prstGeom>
-          <a:solidFill>
-            <a:schemeClr val="accent6"/>
-          </a:solidFill>
-        </p:spPr>
-        <p:style>
-          <a:lnRef idx="2">
-            <a:schemeClr val="accent1">
-              <a:shade val="50000"/>
-            </a:schemeClr>
-          </a:lnRef>
-          <a:fillRef idx="1">
-            <a:schemeClr val="accent1"/>
-          </a:fillRef>
-          <a:effectRef idx="0">
-            <a:schemeClr val="accent1"/>
-          </a:effectRef>
-          <a:fontRef idx="minor">
-            <a:schemeClr val="lt1"/>
-          </a:fontRef>
-        </p:style>
-        <p:txBody>
-          <a:bodyPr rtlCol="0" anchor="ctr"/>
-          <a:lstStyle/>
-          <a:p>
-            <a:pPr algn="ctr"/>
-            <a:r>
-              <a:rPr lang="fr-FR" sz="900" dirty="0"/>
-              <a:t>Pot. Bleu</a:t>
-            </a:r>
-          </a:p>
-        </p:txBody>
-      </p:sp>
-      <p:sp>
-        <p:nvSpPr>
-          <p:cNvPr id="77" name="Rectangle : coins arrondis 76">
-            <a:extLst>
-              <a:ext uri="{FF2B5EF4-FFF2-40B4-BE49-F238E27FC236}">
-                <a16:creationId xmlns:a16="http://schemas.microsoft.com/office/drawing/2014/main" id="{509AF568-D44F-4FF6-9C99-29251712DE85}"/>
-              </a:ext>
-            </a:extLst>
-          </p:cNvPr>
-          <p:cNvSpPr/>
-          <p:nvPr/>
-        </p:nvSpPr>
-        <p:spPr>
-          <a:xfrm rot="5400000">
-            <a:off x="6045595" y="4495354"/>
-            <a:ext cx="854593" cy="148656"/>
-          </a:xfrm>
-          <a:prstGeom prst="roundRect">
-            <a:avLst/>
-          </a:prstGeom>
-          <a:solidFill>
-            <a:schemeClr val="accent6"/>
-          </a:solidFill>
-        </p:spPr>
-        <p:style>
-          <a:lnRef idx="2">
-            <a:schemeClr val="accent1">
-              <a:shade val="50000"/>
-            </a:schemeClr>
-          </a:lnRef>
-          <a:fillRef idx="1">
-            <a:schemeClr val="accent1"/>
-          </a:fillRef>
-          <a:effectRef idx="0">
-            <a:schemeClr val="accent1"/>
-          </a:effectRef>
-          <a:fontRef idx="minor">
-            <a:schemeClr val="lt1"/>
-          </a:fontRef>
-        </p:style>
-        <p:txBody>
-          <a:bodyPr rtlCol="0" anchor="ctr"/>
-          <a:lstStyle/>
-          <a:p>
-            <a:pPr algn="ctr"/>
-            <a:r>
-              <a:rPr lang="fr-FR" sz="900" dirty="0"/>
-              <a:t>Pot. Vert</a:t>
-            </a:r>
-          </a:p>
-        </p:txBody>
-      </p:sp>
-      <p:sp>
-        <p:nvSpPr>
-          <p:cNvPr id="2" name="Rectangle 1">
-            <a:extLst>
-              <a:ext uri="{FF2B5EF4-FFF2-40B4-BE49-F238E27FC236}">
-                <a16:creationId xmlns:a16="http://schemas.microsoft.com/office/drawing/2014/main" id="{D6E694E0-DF0B-49CD-828F-A2C934760845}"/>
-              </a:ext>
-            </a:extLst>
-          </p:cNvPr>
-          <p:cNvSpPr/>
-          <p:nvPr/>
-        </p:nvSpPr>
-        <p:spPr>
-          <a:xfrm>
-            <a:off x="5927119" y="5454649"/>
-            <a:ext cx="215925" cy="112629"/>
-          </a:xfrm>
-          <a:prstGeom prst="rect">
-            <a:avLst/>
-          </a:prstGeom>
-          <a:solidFill>
-            <a:schemeClr val="bg1"/>
-          </a:solidFill>
-          <a:ln>
-            <a:noFill/>
-          </a:ln>
-        </p:spPr>
-        <p:style>
-          <a:lnRef idx="2">
-            <a:schemeClr val="accent1">
-              <a:shade val="50000"/>
-            </a:schemeClr>
-          </a:lnRef>
-          <a:fillRef idx="1">
-            <a:schemeClr val="accent1"/>
-          </a:fillRef>
-          <a:effectRef idx="0">
-            <a:schemeClr val="accent1"/>
-          </a:effectRef>
-          <a:fontRef idx="minor">
-            <a:schemeClr val="lt1"/>
-          </a:fontRef>
-        </p:style>
-        <p:txBody>
-          <a:bodyPr rtlCol="0" anchor="ctr"/>
-          <a:lstStyle/>
-          <a:p>
-            <a:pPr algn="ctr"/>
-            <a:endParaRPr lang="fr-FR">
-              <a:solidFill>
-                <a:schemeClr val="bg1"/>
-              </a:solidFill>
-            </a:endParaRPr>
-          </a:p>
-        </p:txBody>
-      </p:sp>
-      <p:sp>
-        <p:nvSpPr>
-          <p:cNvPr id="78" name="Rectangle 77">
-            <a:extLst>
-              <a:ext uri="{FF2B5EF4-FFF2-40B4-BE49-F238E27FC236}">
-                <a16:creationId xmlns:a16="http://schemas.microsoft.com/office/drawing/2014/main" id="{156DD774-CBA8-40ED-90E7-FC7D8BE3EC21}"/>
-              </a:ext>
-            </a:extLst>
-          </p:cNvPr>
-          <p:cNvSpPr/>
-          <p:nvPr/>
-        </p:nvSpPr>
-        <p:spPr>
-          <a:xfrm>
-            <a:off x="6366768" y="5446014"/>
-            <a:ext cx="215925" cy="112629"/>
-          </a:xfrm>
-          <a:prstGeom prst="rect">
-            <a:avLst/>
-          </a:prstGeom>
-          <a:solidFill>
-            <a:schemeClr val="bg1"/>
-          </a:solidFill>
-          <a:ln>
-            <a:noFill/>
-          </a:ln>
-        </p:spPr>
-        <p:style>
-          <a:lnRef idx="2">
-            <a:schemeClr val="accent1">
-              <a:shade val="50000"/>
-            </a:schemeClr>
-          </a:lnRef>
-          <a:fillRef idx="1">
-            <a:schemeClr val="accent1"/>
-          </a:fillRef>
-          <a:effectRef idx="0">
-            <a:schemeClr val="accent1"/>
-          </a:effectRef>
-          <a:fontRef idx="minor">
-            <a:schemeClr val="lt1"/>
-          </a:fontRef>
-        </p:style>
-        <p:txBody>
-          <a:bodyPr rtlCol="0" anchor="ctr"/>
-          <a:lstStyle/>
-          <a:p>
-            <a:pPr algn="ctr"/>
-            <a:endParaRPr lang="fr-FR">
-              <a:solidFill>
-                <a:schemeClr val="bg1"/>
-              </a:solidFill>
-            </a:endParaRPr>
-          </a:p>
-        </p:txBody>
-      </p:sp>
-      <p:sp>
-        <p:nvSpPr>
-          <p:cNvPr id="79" name="Rectangle 78">
-            <a:extLst>
-              <a:ext uri="{FF2B5EF4-FFF2-40B4-BE49-F238E27FC236}">
-                <a16:creationId xmlns:a16="http://schemas.microsoft.com/office/drawing/2014/main" id="{57F854DB-6C09-45F7-AEF5-8A9708638E6D}"/>
-              </a:ext>
-            </a:extLst>
-          </p:cNvPr>
-          <p:cNvSpPr/>
-          <p:nvPr/>
-        </p:nvSpPr>
-        <p:spPr>
-          <a:xfrm>
-            <a:off x="6829933" y="5446014"/>
-            <a:ext cx="215925" cy="112629"/>
-          </a:xfrm>
-          <a:prstGeom prst="rect">
-            <a:avLst/>
-          </a:prstGeom>
-          <a:solidFill>
-            <a:schemeClr val="bg1"/>
-          </a:solidFill>
-          <a:ln>
-            <a:noFill/>
-          </a:ln>
-        </p:spPr>
-        <p:style>
-          <a:lnRef idx="2">
-            <a:schemeClr val="accent1">
-              <a:shade val="50000"/>
-            </a:schemeClr>
-          </a:lnRef>
-          <a:fillRef idx="1">
-            <a:schemeClr val="accent1"/>
-          </a:fillRef>
-          <a:effectRef idx="0">
-            <a:schemeClr val="accent1"/>
-          </a:effectRef>
-          <a:fontRef idx="minor">
-            <a:schemeClr val="lt1"/>
-          </a:fontRef>
-        </p:style>
-        <p:txBody>
-          <a:bodyPr rtlCol="0" anchor="ctr"/>
-          <a:lstStyle/>
-          <a:p>
-            <a:pPr algn="ctr"/>
-            <a:endParaRPr lang="fr-FR">
-              <a:solidFill>
-                <a:schemeClr val="bg1"/>
-              </a:solidFill>
-            </a:endParaRPr>
-          </a:p>
-        </p:txBody>
-      </p:sp>
-      <p:sp>
-        <p:nvSpPr>
-          <p:cNvPr id="85" name="Rectangle : coins arrondis 84">
-            <a:extLst>
-              <a:ext uri="{FF2B5EF4-FFF2-40B4-BE49-F238E27FC236}">
-                <a16:creationId xmlns:a16="http://schemas.microsoft.com/office/drawing/2014/main" id="{FFC02612-88AD-47AF-A35C-19703A212612}"/>
-              </a:ext>
-            </a:extLst>
-          </p:cNvPr>
-          <p:cNvSpPr/>
-          <p:nvPr/>
-        </p:nvSpPr>
-        <p:spPr>
-          <a:xfrm rot="5400000">
-            <a:off x="5410287" y="1979002"/>
-            <a:ext cx="333374" cy="624337"/>
-          </a:xfrm>
-          <a:prstGeom prst="roundRect">
-            <a:avLst/>
-          </a:prstGeom>
-          <a:solidFill>
-            <a:schemeClr val="accent5">
-              <a:lumMod val="20000"/>
-              <a:lumOff val="80000"/>
-            </a:schemeClr>
-          </a:solidFill>
-        </p:spPr>
-        <p:style>
-          <a:lnRef idx="2">
-            <a:schemeClr val="accent1">
-              <a:shade val="50000"/>
-            </a:schemeClr>
-          </a:lnRef>
-          <a:fillRef idx="1">
-            <a:schemeClr val="accent1"/>
-          </a:fillRef>
-          <a:effectRef idx="0">
-            <a:schemeClr val="accent1"/>
-          </a:effectRef>
-          <a:fontRef idx="minor">
-            <a:schemeClr val="lt1"/>
-          </a:fontRef>
-        </p:style>
-        <p:txBody>
-          <a:bodyPr vert="vert270" rtlCol="0" anchor="ctr"/>
-          <a:lstStyle/>
-          <a:p>
-            <a:pPr algn="ctr"/>
-            <a:r>
-              <a:rPr lang="fr-FR" sz="1050" dirty="0">
-                <a:solidFill>
-                  <a:schemeClr val="bg1">
-                    <a:lumMod val="50000"/>
-                  </a:schemeClr>
-                </a:solidFill>
-              </a:rPr>
-              <a:t>DMX512</a:t>
-            </a:r>
-          </a:p>
-        </p:txBody>
-      </p:sp>
-      <p:sp>
-        <p:nvSpPr>
-          <p:cNvPr id="86" name="Rectangle : coins arrondis 85">
-            <a:extLst>
-              <a:ext uri="{FF2B5EF4-FFF2-40B4-BE49-F238E27FC236}">
-                <a16:creationId xmlns:a16="http://schemas.microsoft.com/office/drawing/2014/main" id="{CE06A19E-0626-48DB-9473-9048D870539A}"/>
-              </a:ext>
-            </a:extLst>
-          </p:cNvPr>
-          <p:cNvSpPr/>
-          <p:nvPr/>
-        </p:nvSpPr>
-        <p:spPr>
-          <a:xfrm>
-            <a:off x="8824647" y="4914114"/>
-            <a:ext cx="742396" cy="361814"/>
-          </a:xfrm>
-          <a:prstGeom prst="roundRect">
-            <a:avLst/>
-          </a:prstGeom>
-          <a:solidFill>
-            <a:srgbClr val="FF0000"/>
-          </a:solidFill>
-        </p:spPr>
-        <p:style>
-          <a:lnRef idx="2">
-            <a:schemeClr val="accent1">
-              <a:shade val="50000"/>
-            </a:schemeClr>
-          </a:lnRef>
-          <a:fillRef idx="1">
-            <a:schemeClr val="accent1"/>
-          </a:fillRef>
-          <a:effectRef idx="0">
-            <a:schemeClr val="accent1"/>
-          </a:effectRef>
-          <a:fontRef idx="minor">
-            <a:schemeClr val="lt1"/>
-          </a:fontRef>
-        </p:style>
-        <p:txBody>
-          <a:bodyPr rtlCol="0" anchor="ctr"/>
-          <a:lstStyle/>
-          <a:p>
-            <a:pPr algn="ctr"/>
-            <a:r>
-              <a:rPr lang="fr-FR" sz="900" dirty="0"/>
-              <a:t>POWER IN</a:t>
-            </a:r>
-          </a:p>
-          <a:p>
-            <a:pPr algn="ctr"/>
-            <a:r>
-              <a:rPr lang="fr-FR" sz="900" dirty="0"/>
-              <a:t>5 à 12 V</a:t>
-            </a:r>
-          </a:p>
-        </p:txBody>
-      </p:sp>
-      <p:sp>
-        <p:nvSpPr>
-          <p:cNvPr id="87" name="Rectangle : coins arrondis 86">
-            <a:extLst>
-              <a:ext uri="{FF2B5EF4-FFF2-40B4-BE49-F238E27FC236}">
-                <a16:creationId xmlns:a16="http://schemas.microsoft.com/office/drawing/2014/main" id="{5BAB72AF-309E-45B5-8816-F5FD148BFD86}"/>
-              </a:ext>
-            </a:extLst>
-          </p:cNvPr>
-          <p:cNvSpPr/>
-          <p:nvPr/>
-        </p:nvSpPr>
-        <p:spPr>
-          <a:xfrm>
-            <a:off x="8824648" y="5335082"/>
-            <a:ext cx="742396" cy="159159"/>
-          </a:xfrm>
-          <a:prstGeom prst="roundRect">
-            <a:avLst/>
-          </a:prstGeom>
-          <a:solidFill>
-            <a:schemeClr val="tx1"/>
-          </a:solidFill>
-        </p:spPr>
-        <p:style>
-          <a:lnRef idx="2">
-            <a:schemeClr val="accent1">
-              <a:shade val="50000"/>
-            </a:schemeClr>
-          </a:lnRef>
-          <a:fillRef idx="1">
-            <a:schemeClr val="accent1"/>
-          </a:fillRef>
-          <a:effectRef idx="0">
-            <a:schemeClr val="accent1"/>
-          </a:effectRef>
-          <a:fontRef idx="minor">
-            <a:schemeClr val="lt1"/>
-          </a:fontRef>
-        </p:style>
-        <p:txBody>
-          <a:bodyPr rtlCol="0" anchor="ctr"/>
-          <a:lstStyle/>
-          <a:p>
-            <a:pPr algn="ctr"/>
-            <a:r>
-              <a:rPr lang="fr-FR" sz="1100" dirty="0"/>
-              <a:t>GND</a:t>
-            </a:r>
-          </a:p>
-        </p:txBody>
-      </p:sp>
-      <p:sp>
-        <p:nvSpPr>
-          <p:cNvPr id="88" name="Rectangle : coins arrondis 87">
-            <a:extLst>
-              <a:ext uri="{FF2B5EF4-FFF2-40B4-BE49-F238E27FC236}">
-                <a16:creationId xmlns:a16="http://schemas.microsoft.com/office/drawing/2014/main" id="{403F3B48-39D6-4936-AD75-126E84F8E961}"/>
-              </a:ext>
-            </a:extLst>
-          </p:cNvPr>
-          <p:cNvSpPr/>
-          <p:nvPr/>
-        </p:nvSpPr>
-        <p:spPr>
-          <a:xfrm rot="16200000">
-            <a:off x="7611111" y="6328648"/>
-            <a:ext cx="633816" cy="148657"/>
-          </a:xfrm>
-          <a:prstGeom prst="roundRect">
-            <a:avLst/>
-          </a:prstGeom>
-          <a:solidFill>
-            <a:schemeClr val="tx1"/>
-          </a:solidFill>
-        </p:spPr>
-        <p:style>
-          <a:lnRef idx="2">
-            <a:schemeClr val="accent1">
-              <a:shade val="50000"/>
-            </a:schemeClr>
-          </a:lnRef>
-          <a:fillRef idx="1">
-            <a:schemeClr val="accent1"/>
-          </a:fillRef>
-          <a:effectRef idx="0">
-            <a:schemeClr val="accent1"/>
-          </a:effectRef>
-          <a:fontRef idx="minor">
-            <a:schemeClr val="lt1"/>
-          </a:fontRef>
-        </p:style>
-        <p:txBody>
-          <a:bodyPr rtlCol="0" anchor="ctr"/>
-          <a:lstStyle/>
-          <a:p>
-            <a:pPr algn="ctr"/>
-            <a:r>
-              <a:rPr lang="fr-FR" sz="1100" dirty="0"/>
-              <a:t>GND</a:t>
-            </a:r>
-          </a:p>
-        </p:txBody>
-      </p:sp>
-      <p:sp>
-        <p:nvSpPr>
-          <p:cNvPr id="89" name="Rectangle : coins arrondis 88">
-            <a:extLst>
-              <a:ext uri="{FF2B5EF4-FFF2-40B4-BE49-F238E27FC236}">
-                <a16:creationId xmlns:a16="http://schemas.microsoft.com/office/drawing/2014/main" id="{1AD0AE35-E7AF-442D-B78B-0367570E7AC6}"/>
-              </a:ext>
-            </a:extLst>
-          </p:cNvPr>
-          <p:cNvSpPr/>
-          <p:nvPr/>
-        </p:nvSpPr>
-        <p:spPr>
-          <a:xfrm rot="16200000">
-            <a:off x="7055729" y="6328651"/>
-            <a:ext cx="633812" cy="148656"/>
-          </a:xfrm>
-          <a:prstGeom prst="roundRect">
-            <a:avLst/>
-          </a:prstGeom>
-          <a:solidFill>
-            <a:schemeClr val="tx1"/>
-          </a:solidFill>
-        </p:spPr>
-        <p:style>
-          <a:lnRef idx="2">
-            <a:schemeClr val="accent1">
-              <a:shade val="50000"/>
-            </a:schemeClr>
-          </a:lnRef>
-          <a:fillRef idx="1">
-            <a:schemeClr val="accent1"/>
-          </a:fillRef>
-          <a:effectRef idx="0">
-            <a:schemeClr val="accent1"/>
-          </a:effectRef>
-          <a:fontRef idx="minor">
-            <a:schemeClr val="lt1"/>
-          </a:fontRef>
-        </p:style>
-        <p:txBody>
-          <a:bodyPr rtlCol="0" anchor="ctr"/>
-          <a:lstStyle/>
-          <a:p>
-            <a:pPr algn="ctr"/>
-            <a:r>
-              <a:rPr lang="fr-FR" sz="1100" dirty="0"/>
-              <a:t>GND</a:t>
-            </a:r>
-          </a:p>
-        </p:txBody>
-      </p:sp>
-      <p:sp>
-        <p:nvSpPr>
-          <p:cNvPr id="90" name="Rectangle : coins arrondis 89">
-            <a:extLst>
-              <a:ext uri="{FF2B5EF4-FFF2-40B4-BE49-F238E27FC236}">
-                <a16:creationId xmlns:a16="http://schemas.microsoft.com/office/drawing/2014/main" id="{D4C3E6EB-B1AE-4614-970C-D7E2D512F96D}"/>
-              </a:ext>
-            </a:extLst>
-          </p:cNvPr>
-          <p:cNvSpPr/>
-          <p:nvPr/>
-        </p:nvSpPr>
-        <p:spPr>
-          <a:xfrm rot="16200000">
-            <a:off x="6819353" y="6328651"/>
-            <a:ext cx="633813" cy="148656"/>
-          </a:xfrm>
-          <a:prstGeom prst="roundRect">
-            <a:avLst/>
-          </a:prstGeom>
-          <a:solidFill>
-            <a:schemeClr val="accent6"/>
-          </a:solidFill>
-        </p:spPr>
-        <p:style>
-          <a:lnRef idx="2">
-            <a:schemeClr val="accent1">
-              <a:shade val="50000"/>
-            </a:schemeClr>
-          </a:lnRef>
-          <a:fillRef idx="1">
-            <a:schemeClr val="accent1"/>
-          </a:fillRef>
-          <a:effectRef idx="0">
-            <a:schemeClr val="accent1"/>
-          </a:effectRef>
-          <a:fontRef idx="minor">
-            <a:schemeClr val="lt1"/>
-          </a:fontRef>
-        </p:style>
-        <p:txBody>
-          <a:bodyPr rtlCol="0" anchor="ctr"/>
-          <a:lstStyle/>
-          <a:p>
-            <a:pPr algn="ctr"/>
-            <a:r>
-              <a:rPr lang="fr-FR" sz="900" dirty="0" err="1"/>
-              <a:t>Filter</a:t>
-            </a:r>
-            <a:r>
-              <a:rPr lang="fr-FR" sz="900" dirty="0"/>
-              <a:t> IN</a:t>
-            </a:r>
-          </a:p>
-        </p:txBody>
-      </p:sp>
-      <p:sp>
-        <p:nvSpPr>
-          <p:cNvPr id="91" name="Rectangle : coins arrondis 90">
-            <a:extLst>
-              <a:ext uri="{FF2B5EF4-FFF2-40B4-BE49-F238E27FC236}">
-                <a16:creationId xmlns:a16="http://schemas.microsoft.com/office/drawing/2014/main" id="{50A7CF6E-3804-4A82-9341-D85B9ECD793C}"/>
-              </a:ext>
-            </a:extLst>
-          </p:cNvPr>
-          <p:cNvSpPr/>
-          <p:nvPr/>
-        </p:nvSpPr>
-        <p:spPr>
-          <a:xfrm rot="16200000">
-            <a:off x="7374736" y="6328651"/>
-            <a:ext cx="633814" cy="148656"/>
-          </a:xfrm>
-          <a:prstGeom prst="roundRect">
-            <a:avLst/>
-          </a:prstGeom>
-          <a:solidFill>
-            <a:schemeClr val="accent6"/>
-          </a:solidFill>
-        </p:spPr>
-        <p:style>
-          <a:lnRef idx="2">
-            <a:schemeClr val="accent1">
-              <a:shade val="50000"/>
-            </a:schemeClr>
-          </a:lnRef>
-          <a:fillRef idx="1">
-            <a:schemeClr val="accent1"/>
-          </a:fillRef>
-          <a:effectRef idx="0">
-            <a:schemeClr val="accent1"/>
-          </a:effectRef>
-          <a:fontRef idx="minor">
-            <a:schemeClr val="lt1"/>
-          </a:fontRef>
-        </p:style>
-        <p:txBody>
-          <a:bodyPr rtlCol="0" anchor="ctr"/>
-          <a:lstStyle/>
-          <a:p>
-            <a:pPr algn="ctr"/>
-            <a:r>
-              <a:rPr lang="fr-FR" sz="900" dirty="0"/>
-              <a:t>Direct IN</a:t>
-            </a:r>
-          </a:p>
-        </p:txBody>
-      </p:sp>
-      <p:sp>
-        <p:nvSpPr>
-          <p:cNvPr id="94" name="Rectangle 93">
-            <a:extLst>
-              <a:ext uri="{FF2B5EF4-FFF2-40B4-BE49-F238E27FC236}">
-                <a16:creationId xmlns:a16="http://schemas.microsoft.com/office/drawing/2014/main" id="{106E6BA5-C78D-4492-960F-6537964D44AF}"/>
-              </a:ext>
-            </a:extLst>
-          </p:cNvPr>
-          <p:cNvSpPr/>
-          <p:nvPr/>
-        </p:nvSpPr>
-        <p:spPr>
-          <a:xfrm>
-            <a:off x="7446963" y="2647469"/>
-            <a:ext cx="897130" cy="267982"/>
-          </a:xfrm>
-          <a:prstGeom prst="rect">
-            <a:avLst/>
-          </a:prstGeom>
-          <a:solidFill>
-            <a:schemeClr val="accent1">
-              <a:alpha val="50000"/>
-            </a:schemeClr>
-          </a:solidFill>
-        </p:spPr>
-        <p:style>
-          <a:lnRef idx="2">
-            <a:schemeClr val="accent1">
-              <a:shade val="50000"/>
-            </a:schemeClr>
-          </a:lnRef>
-          <a:fillRef idx="1">
-            <a:schemeClr val="accent1"/>
-          </a:fillRef>
-          <a:effectRef idx="0">
-            <a:schemeClr val="accent1"/>
-          </a:effectRef>
-          <a:fontRef idx="minor">
-            <a:schemeClr val="lt1"/>
-          </a:fontRef>
-        </p:style>
-        <p:txBody>
-          <a:bodyPr rtlCol="0" anchor="ctr"/>
-          <a:lstStyle/>
-          <a:p>
-            <a:pPr algn="ctr"/>
-            <a:endParaRPr lang="fr-FR"/>
-          </a:p>
-        </p:txBody>
-      </p:sp>
-      <p:sp>
-        <p:nvSpPr>
-          <p:cNvPr id="5" name="Rectangle : coins arrondis 4">
-            <a:extLst>
-              <a:ext uri="{FF2B5EF4-FFF2-40B4-BE49-F238E27FC236}">
-                <a16:creationId xmlns:a16="http://schemas.microsoft.com/office/drawing/2014/main" id="{321E3E76-8F12-846A-07E7-0692C5F10994}"/>
-              </a:ext>
-            </a:extLst>
-          </p:cNvPr>
-          <p:cNvSpPr/>
-          <p:nvPr/>
-        </p:nvSpPr>
-        <p:spPr>
-          <a:xfrm>
-            <a:off x="1235161" y="3002467"/>
-            <a:ext cx="854593" cy="148656"/>
-          </a:xfrm>
-          <a:prstGeom prst="roundRect">
-            <a:avLst/>
-          </a:prstGeom>
-          <a:solidFill>
-            <a:schemeClr val="accent6"/>
-          </a:solidFill>
-        </p:spPr>
-        <p:style>
-          <a:lnRef idx="2">
-            <a:schemeClr val="accent1">
-              <a:shade val="50000"/>
-            </a:schemeClr>
-          </a:lnRef>
-          <a:fillRef idx="1">
-            <a:schemeClr val="accent1"/>
-          </a:fillRef>
-          <a:effectRef idx="0">
-            <a:schemeClr val="accent1"/>
-          </a:effectRef>
-          <a:fontRef idx="minor">
-            <a:schemeClr val="lt1"/>
-          </a:fontRef>
-        </p:style>
-        <p:txBody>
-          <a:bodyPr rtlCol="0" anchor="ctr"/>
-          <a:lstStyle/>
-          <a:p>
-            <a:pPr algn="ctr"/>
-            <a:r>
-              <a:rPr lang="fr-FR" sz="900" dirty="0"/>
-              <a:t>PC_0</a:t>
-            </a:r>
-          </a:p>
-        </p:txBody>
-      </p:sp>
-      <p:sp>
-        <p:nvSpPr>
-          <p:cNvPr id="8" name="Rectangle : coins arrondis 7">
-            <a:extLst>
-              <a:ext uri="{FF2B5EF4-FFF2-40B4-BE49-F238E27FC236}">
-                <a16:creationId xmlns:a16="http://schemas.microsoft.com/office/drawing/2014/main" id="{AAACDE4E-4802-E57C-46E3-AF6AFEEB4755}"/>
-              </a:ext>
-            </a:extLst>
-          </p:cNvPr>
-          <p:cNvSpPr/>
-          <p:nvPr/>
-        </p:nvSpPr>
-        <p:spPr>
-          <a:xfrm>
-            <a:off x="1235160" y="3207253"/>
-            <a:ext cx="854593" cy="148656"/>
-          </a:xfrm>
-          <a:prstGeom prst="roundRect">
-            <a:avLst/>
-          </a:prstGeom>
-          <a:solidFill>
-            <a:schemeClr val="accent6"/>
-          </a:solidFill>
-        </p:spPr>
-        <p:style>
-          <a:lnRef idx="2">
-            <a:schemeClr val="accent1">
-              <a:shade val="50000"/>
-            </a:schemeClr>
-          </a:lnRef>
-          <a:fillRef idx="1">
-            <a:schemeClr val="accent1"/>
-          </a:fillRef>
-          <a:effectRef idx="0">
-            <a:schemeClr val="accent1"/>
-          </a:effectRef>
-          <a:fontRef idx="minor">
-            <a:schemeClr val="lt1"/>
-          </a:fontRef>
-        </p:style>
-        <p:txBody>
-          <a:bodyPr rtlCol="0" anchor="ctr"/>
-          <a:lstStyle/>
-          <a:p>
-            <a:pPr algn="ctr"/>
-            <a:r>
-              <a:rPr lang="fr-FR" sz="900" dirty="0"/>
-              <a:t>PC_3</a:t>
-            </a:r>
-          </a:p>
-        </p:txBody>
-      </p:sp>
-      <p:sp>
-        <p:nvSpPr>
-          <p:cNvPr id="9" name="Rectangle : coins arrondis 8">
-            <a:extLst>
-              <a:ext uri="{FF2B5EF4-FFF2-40B4-BE49-F238E27FC236}">
-                <a16:creationId xmlns:a16="http://schemas.microsoft.com/office/drawing/2014/main" id="{F07916D9-46D9-4F52-A259-88ACF4CA4F27}"/>
-              </a:ext>
-            </a:extLst>
-          </p:cNvPr>
-          <p:cNvSpPr/>
-          <p:nvPr/>
-        </p:nvSpPr>
-        <p:spPr>
-          <a:xfrm>
-            <a:off x="1237817" y="3406666"/>
-            <a:ext cx="854593" cy="148656"/>
-          </a:xfrm>
-          <a:prstGeom prst="roundRect">
-            <a:avLst/>
-          </a:prstGeom>
-          <a:solidFill>
-            <a:schemeClr val="accent6"/>
-          </a:solidFill>
-        </p:spPr>
-        <p:style>
-          <a:lnRef idx="2">
-            <a:schemeClr val="accent1">
-              <a:shade val="50000"/>
-            </a:schemeClr>
-          </a:lnRef>
-          <a:fillRef idx="1">
-            <a:schemeClr val="accent1"/>
-          </a:fillRef>
-          <a:effectRef idx="0">
-            <a:schemeClr val="accent1"/>
-          </a:effectRef>
-          <a:fontRef idx="minor">
-            <a:schemeClr val="lt1"/>
-          </a:fontRef>
-        </p:style>
-        <p:txBody>
-          <a:bodyPr rtlCol="0" anchor="ctr"/>
-          <a:lstStyle/>
-          <a:p>
-            <a:pPr algn="ctr"/>
-            <a:r>
-              <a:rPr lang="fr-FR" sz="900" dirty="0"/>
-              <a:t>PC_2</a:t>
-            </a:r>
-          </a:p>
-        </p:txBody>
-      </p:sp>
-      <p:sp>
-        <p:nvSpPr>
-          <p:cNvPr id="13" name="Rectangle : coins arrondis 12">
-            <a:extLst>
-              <a:ext uri="{FF2B5EF4-FFF2-40B4-BE49-F238E27FC236}">
-                <a16:creationId xmlns:a16="http://schemas.microsoft.com/office/drawing/2014/main" id="{A75A7A61-DBD6-E694-621F-28F5C5B5A694}"/>
-              </a:ext>
-            </a:extLst>
-          </p:cNvPr>
-          <p:cNvSpPr/>
-          <p:nvPr/>
-        </p:nvSpPr>
-        <p:spPr>
-          <a:xfrm>
-            <a:off x="2175234" y="3002467"/>
-            <a:ext cx="854593" cy="148656"/>
-          </a:xfrm>
-          <a:prstGeom prst="roundRect">
-            <a:avLst/>
-          </a:prstGeom>
-          <a:solidFill>
-            <a:schemeClr val="accent6"/>
-          </a:solidFill>
-        </p:spPr>
-        <p:style>
-          <a:lnRef idx="2">
-            <a:schemeClr val="accent1">
-              <a:shade val="50000"/>
-            </a:schemeClr>
-          </a:lnRef>
-          <a:fillRef idx="1">
-            <a:schemeClr val="accent1"/>
-          </a:fillRef>
-          <a:effectRef idx="0">
-            <a:schemeClr val="accent1"/>
-          </a:effectRef>
-          <a:fontRef idx="minor">
-            <a:schemeClr val="lt1"/>
-          </a:fontRef>
-        </p:style>
-        <p:txBody>
-          <a:bodyPr rtlCol="0" anchor="ctr"/>
-          <a:lstStyle/>
-          <a:p>
-            <a:pPr algn="ctr"/>
-            <a:r>
-              <a:rPr lang="fr-FR" sz="900" dirty="0"/>
-              <a:t>Pot. Rouge</a:t>
-            </a:r>
-          </a:p>
-        </p:txBody>
-      </p:sp>
-      <p:sp>
-        <p:nvSpPr>
-          <p:cNvPr id="14" name="Rectangle : coins arrondis 13">
-            <a:extLst>
-              <a:ext uri="{FF2B5EF4-FFF2-40B4-BE49-F238E27FC236}">
-                <a16:creationId xmlns:a16="http://schemas.microsoft.com/office/drawing/2014/main" id="{0D7647D3-5D25-2DC0-C075-D72723B23CEE}"/>
-              </a:ext>
-            </a:extLst>
-          </p:cNvPr>
-          <p:cNvSpPr/>
-          <p:nvPr/>
-        </p:nvSpPr>
-        <p:spPr>
-          <a:xfrm>
-            <a:off x="2175234" y="3206279"/>
-            <a:ext cx="854593" cy="148656"/>
-          </a:xfrm>
-          <a:prstGeom prst="roundRect">
-            <a:avLst/>
-          </a:prstGeom>
-          <a:solidFill>
-            <a:schemeClr val="accent6"/>
-          </a:solidFill>
-        </p:spPr>
-        <p:style>
-          <a:lnRef idx="2">
-            <a:schemeClr val="accent1">
-              <a:shade val="50000"/>
-            </a:schemeClr>
-          </a:lnRef>
-          <a:fillRef idx="1">
-            <a:schemeClr val="accent1"/>
-          </a:fillRef>
-          <a:effectRef idx="0">
-            <a:schemeClr val="accent1"/>
-          </a:effectRef>
-          <a:fontRef idx="minor">
-            <a:schemeClr val="lt1"/>
-          </a:fontRef>
-        </p:style>
-        <p:txBody>
-          <a:bodyPr rtlCol="0" anchor="ctr"/>
-          <a:lstStyle/>
-          <a:p>
-            <a:pPr algn="ctr"/>
-            <a:r>
-              <a:rPr lang="fr-FR" sz="900" dirty="0"/>
-              <a:t>Pot. Bleu</a:t>
-            </a:r>
-          </a:p>
-        </p:txBody>
-      </p:sp>
-      <p:sp>
-        <p:nvSpPr>
-          <p:cNvPr id="15" name="Rectangle : coins arrondis 14">
-            <a:extLst>
-              <a:ext uri="{FF2B5EF4-FFF2-40B4-BE49-F238E27FC236}">
-                <a16:creationId xmlns:a16="http://schemas.microsoft.com/office/drawing/2014/main" id="{A2B67213-0605-D3A2-218B-C411AD16402D}"/>
-              </a:ext>
-            </a:extLst>
-          </p:cNvPr>
-          <p:cNvSpPr/>
-          <p:nvPr/>
-        </p:nvSpPr>
-        <p:spPr>
-          <a:xfrm>
-            <a:off x="2175233" y="3416126"/>
-            <a:ext cx="854593" cy="148656"/>
-          </a:xfrm>
-          <a:prstGeom prst="roundRect">
-            <a:avLst/>
-          </a:prstGeom>
-          <a:solidFill>
-            <a:schemeClr val="accent6"/>
-          </a:solidFill>
-        </p:spPr>
-        <p:style>
-          <a:lnRef idx="2">
-            <a:schemeClr val="accent1">
-              <a:shade val="50000"/>
-            </a:schemeClr>
-          </a:lnRef>
-          <a:fillRef idx="1">
-            <a:schemeClr val="accent1"/>
-          </a:fillRef>
-          <a:effectRef idx="0">
-            <a:schemeClr val="accent1"/>
-          </a:effectRef>
-          <a:fontRef idx="minor">
-            <a:schemeClr val="lt1"/>
-          </a:fontRef>
-        </p:style>
-        <p:txBody>
-          <a:bodyPr rtlCol="0" anchor="ctr"/>
-          <a:lstStyle/>
-          <a:p>
-            <a:pPr algn="ctr"/>
-            <a:r>
-              <a:rPr lang="fr-FR" sz="900" dirty="0"/>
-              <a:t>Pot. Vert</a:t>
-            </a:r>
-          </a:p>
-        </p:txBody>
-      </p:sp>
-      <p:sp>
-        <p:nvSpPr>
-          <p:cNvPr id="20" name="Rectangle : coins arrondis 19">
-            <a:extLst>
-              <a:ext uri="{FF2B5EF4-FFF2-40B4-BE49-F238E27FC236}">
-                <a16:creationId xmlns:a16="http://schemas.microsoft.com/office/drawing/2014/main" id="{2719AE74-418A-A5C6-C222-CEF7036DC494}"/>
-              </a:ext>
-            </a:extLst>
-          </p:cNvPr>
-          <p:cNvSpPr/>
-          <p:nvPr/>
-        </p:nvSpPr>
-        <p:spPr>
-          <a:xfrm>
-            <a:off x="3220569" y="1659200"/>
-            <a:ext cx="772357" cy="1268825"/>
-          </a:xfrm>
-          <a:prstGeom prst="roundRect">
-            <a:avLst/>
-          </a:prstGeom>
-          <a:solidFill>
-            <a:schemeClr val="accent5">
-              <a:lumMod val="20000"/>
-              <a:lumOff val="80000"/>
-            </a:schemeClr>
-          </a:solidFill>
-        </p:spPr>
-        <p:style>
-          <a:lnRef idx="2">
-            <a:schemeClr val="accent1">
-              <a:shade val="50000"/>
-            </a:schemeClr>
-          </a:lnRef>
-          <a:fillRef idx="1">
-            <a:schemeClr val="accent1"/>
-          </a:fillRef>
-          <a:effectRef idx="0">
-            <a:schemeClr val="accent1"/>
-          </a:effectRef>
-          <a:fontRef idx="minor">
-            <a:schemeClr val="lt1"/>
-          </a:fontRef>
-        </p:style>
-        <p:txBody>
-          <a:bodyPr vert="vert270" rtlCol="0" anchor="ctr"/>
-          <a:lstStyle/>
-          <a:p>
-            <a:pPr algn="ctr"/>
-            <a:r>
-              <a:rPr lang="fr-FR" sz="1600" dirty="0">
-                <a:solidFill>
-                  <a:schemeClr val="bg1">
-                    <a:lumMod val="50000"/>
-                  </a:schemeClr>
-                </a:solidFill>
-              </a:rPr>
-              <a:t>DMX512</a:t>
-            </a:r>
-          </a:p>
-        </p:txBody>
-      </p:sp>
-      <p:sp>
-        <p:nvSpPr>
-          <p:cNvPr id="25" name="Rectangle : coins arrondis 24">
-            <a:extLst>
-              <a:ext uri="{FF2B5EF4-FFF2-40B4-BE49-F238E27FC236}">
-                <a16:creationId xmlns:a16="http://schemas.microsoft.com/office/drawing/2014/main" id="{5481E666-C1AB-2941-F5B1-DEA08539E96C}"/>
-              </a:ext>
-            </a:extLst>
-          </p:cNvPr>
-          <p:cNvSpPr/>
-          <p:nvPr/>
-        </p:nvSpPr>
-        <p:spPr>
-          <a:xfrm>
-            <a:off x="1235161" y="1822736"/>
-            <a:ext cx="854593" cy="148656"/>
-          </a:xfrm>
-          <a:prstGeom prst="roundRect">
-            <a:avLst/>
-          </a:prstGeom>
-        </p:spPr>
-        <p:style>
-          <a:lnRef idx="2">
-            <a:schemeClr val="accent1">
-              <a:shade val="50000"/>
-            </a:schemeClr>
-          </a:lnRef>
-          <a:fillRef idx="1">
-            <a:schemeClr val="accent1"/>
-          </a:fillRef>
-          <a:effectRef idx="0">
-            <a:schemeClr val="accent1"/>
-          </a:effectRef>
-          <a:fontRef idx="minor">
-            <a:schemeClr val="lt1"/>
-          </a:fontRef>
-        </p:style>
-        <p:txBody>
-          <a:bodyPr rtlCol="0" anchor="ctr"/>
-          <a:lstStyle/>
-          <a:p>
-            <a:pPr algn="ctr"/>
-            <a:r>
-              <a:rPr lang="fr-FR" sz="900" dirty="0"/>
-              <a:t>PA_0 / TX</a:t>
-            </a:r>
-          </a:p>
-        </p:txBody>
-      </p:sp>
-      <p:sp>
-        <p:nvSpPr>
-          <p:cNvPr id="35" name="Rectangle : coins arrondis 34">
-            <a:extLst>
-              <a:ext uri="{FF2B5EF4-FFF2-40B4-BE49-F238E27FC236}">
-                <a16:creationId xmlns:a16="http://schemas.microsoft.com/office/drawing/2014/main" id="{0FE5468A-0840-1FEF-238C-CC3242A95109}"/>
-              </a:ext>
-            </a:extLst>
-          </p:cNvPr>
-          <p:cNvSpPr/>
-          <p:nvPr/>
-        </p:nvSpPr>
-        <p:spPr>
-          <a:xfrm>
-            <a:off x="2564261" y="1827720"/>
-            <a:ext cx="772357" cy="148656"/>
-          </a:xfrm>
-          <a:prstGeom prst="roundRect">
-            <a:avLst/>
-          </a:prstGeom>
-          <a:solidFill>
-            <a:schemeClr val="accent2"/>
-          </a:solidFill>
-        </p:spPr>
-        <p:style>
-          <a:lnRef idx="2">
-            <a:schemeClr val="accent1">
-              <a:shade val="50000"/>
-            </a:schemeClr>
-          </a:lnRef>
-          <a:fillRef idx="1">
-            <a:schemeClr val="accent1"/>
-          </a:fillRef>
-          <a:effectRef idx="0">
-            <a:schemeClr val="accent1"/>
-          </a:effectRef>
-          <a:fontRef idx="minor">
-            <a:schemeClr val="lt1"/>
-          </a:fontRef>
-        </p:style>
-        <p:txBody>
-          <a:bodyPr rtlCol="0" anchor="ctr"/>
-          <a:lstStyle/>
-          <a:p>
-            <a:pPr algn="ctr"/>
-            <a:r>
-              <a:rPr lang="fr-FR" sz="1100" dirty="0"/>
-              <a:t>DATA_TX</a:t>
-            </a:r>
-          </a:p>
-        </p:txBody>
-      </p:sp>
-      <p:sp>
-        <p:nvSpPr>
-          <p:cNvPr id="45" name="Rectangle : coins arrondis 44">
-            <a:extLst>
-              <a:ext uri="{FF2B5EF4-FFF2-40B4-BE49-F238E27FC236}">
-                <a16:creationId xmlns:a16="http://schemas.microsoft.com/office/drawing/2014/main" id="{2E742CE6-2760-1C6E-EC20-0DAFA3FCEAE6}"/>
-              </a:ext>
-            </a:extLst>
-          </p:cNvPr>
-          <p:cNvSpPr/>
-          <p:nvPr/>
-        </p:nvSpPr>
-        <p:spPr>
-          <a:xfrm rot="5400000">
-            <a:off x="2145193" y="1806887"/>
-            <a:ext cx="363627" cy="369332"/>
-          </a:xfrm>
-          <a:prstGeom prst="roundRect">
-            <a:avLst/>
-          </a:prstGeom>
-          <a:solidFill>
-            <a:schemeClr val="bg1"/>
-          </a:solidFill>
-          <a:ln>
-            <a:solidFill>
-              <a:schemeClr val="tx1"/>
-            </a:solidFill>
-          </a:ln>
-        </p:spPr>
-        <p:style>
-          <a:lnRef idx="2">
-            <a:schemeClr val="accent1">
-              <a:shade val="50000"/>
-            </a:schemeClr>
-          </a:lnRef>
-          <a:fillRef idx="1">
-            <a:schemeClr val="accent1"/>
-          </a:fillRef>
-          <a:effectRef idx="0">
-            <a:schemeClr val="accent1"/>
-          </a:effectRef>
-          <a:fontRef idx="minor">
-            <a:schemeClr val="lt1"/>
-          </a:fontRef>
-        </p:style>
-        <p:txBody>
-          <a:bodyPr vert="vert270" rtlCol="0" anchor="ctr"/>
-          <a:lstStyle/>
-          <a:p>
-            <a:pPr algn="ctr"/>
-            <a:r>
-              <a:rPr lang="fr-FR" sz="700" dirty="0">
-                <a:solidFill>
-                  <a:schemeClr val="tx1"/>
-                </a:solidFill>
-              </a:rPr>
-              <a:t>USART</a:t>
-            </a:r>
-            <a:br>
-              <a:rPr lang="fr-FR" sz="700" dirty="0">
-                <a:solidFill>
-                  <a:schemeClr val="tx1"/>
-                </a:solidFill>
-              </a:rPr>
-            </a:br>
-            <a:r>
-              <a:rPr lang="fr-FR" sz="700" dirty="0">
-                <a:solidFill>
-                  <a:schemeClr val="tx1"/>
-                </a:solidFill>
-              </a:rPr>
-              <a:t>7</a:t>
-            </a:r>
-          </a:p>
-        </p:txBody>
-      </p:sp>
-      <p:sp>
-        <p:nvSpPr>
-          <p:cNvPr id="46" name="ZoneTexte 45">
-            <a:extLst>
-              <a:ext uri="{FF2B5EF4-FFF2-40B4-BE49-F238E27FC236}">
-                <a16:creationId xmlns:a16="http://schemas.microsoft.com/office/drawing/2014/main" id="{FC45B102-E6E4-0A2A-77C7-A11F085B2473}"/>
-              </a:ext>
-            </a:extLst>
-          </p:cNvPr>
-          <p:cNvSpPr txBox="1"/>
-          <p:nvPr/>
-        </p:nvSpPr>
-        <p:spPr>
-          <a:xfrm>
-            <a:off x="2131938" y="1587042"/>
-            <a:ext cx="966931" cy="261610"/>
-          </a:xfrm>
-          <a:prstGeom prst="rect">
-            <a:avLst/>
-          </a:prstGeom>
-          <a:noFill/>
-        </p:spPr>
-        <p:txBody>
-          <a:bodyPr wrap="none" rtlCol="0">
-            <a:spAutoFit/>
-          </a:bodyPr>
-          <a:lstStyle/>
-          <a:p>
-            <a:r>
-              <a:rPr lang="fr-FR" sz="1100" dirty="0"/>
-              <a:t>@250 </a:t>
-            </a:r>
-            <a:r>
-              <a:rPr lang="fr-FR" sz="1100" dirty="0" err="1"/>
-              <a:t>kbauds</a:t>
-            </a:r>
-            <a:endParaRPr lang="fr-FR" sz="1100" dirty="0"/>
-          </a:p>
-        </p:txBody>
-      </p:sp>
-      <p:sp>
-        <p:nvSpPr>
-          <p:cNvPr id="47" name="Rectangle : coins arrondis 46">
-            <a:extLst>
-              <a:ext uri="{FF2B5EF4-FFF2-40B4-BE49-F238E27FC236}">
-                <a16:creationId xmlns:a16="http://schemas.microsoft.com/office/drawing/2014/main" id="{62D80C07-C6DD-0A00-7E03-992C1B2B82C4}"/>
-              </a:ext>
-            </a:extLst>
-          </p:cNvPr>
-          <p:cNvSpPr/>
-          <p:nvPr/>
-        </p:nvSpPr>
-        <p:spPr>
-          <a:xfrm>
-            <a:off x="1239941" y="2253474"/>
-            <a:ext cx="854593" cy="148656"/>
-          </a:xfrm>
-          <a:prstGeom prst="roundRect">
-            <a:avLst/>
-          </a:prstGeom>
-        </p:spPr>
-        <p:style>
-          <a:lnRef idx="2">
-            <a:schemeClr val="accent1">
-              <a:shade val="50000"/>
-            </a:schemeClr>
-          </a:lnRef>
-          <a:fillRef idx="1">
-            <a:schemeClr val="accent1"/>
-          </a:fillRef>
-          <a:effectRef idx="0">
-            <a:schemeClr val="accent1"/>
-          </a:effectRef>
-          <a:fontRef idx="minor">
-            <a:schemeClr val="lt1"/>
-          </a:fontRef>
-        </p:style>
-        <p:txBody>
-          <a:bodyPr rtlCol="0" anchor="ctr"/>
-          <a:lstStyle/>
-          <a:p>
-            <a:pPr algn="ctr"/>
-            <a:r>
-              <a:rPr lang="fr-FR" sz="900" dirty="0"/>
-              <a:t>D6</a:t>
-            </a:r>
-          </a:p>
-        </p:txBody>
-      </p:sp>
-      <p:sp>
-        <p:nvSpPr>
-          <p:cNvPr id="48" name="Rectangle : coins arrondis 47">
-            <a:extLst>
-              <a:ext uri="{FF2B5EF4-FFF2-40B4-BE49-F238E27FC236}">
-                <a16:creationId xmlns:a16="http://schemas.microsoft.com/office/drawing/2014/main" id="{2FF7AC9A-3286-6762-178F-8114D621557B}"/>
-              </a:ext>
-            </a:extLst>
-          </p:cNvPr>
-          <p:cNvSpPr/>
-          <p:nvPr/>
-        </p:nvSpPr>
-        <p:spPr>
-          <a:xfrm>
-            <a:off x="1235161" y="2450747"/>
-            <a:ext cx="854593" cy="148656"/>
-          </a:xfrm>
-          <a:prstGeom prst="roundRect">
-            <a:avLst/>
-          </a:prstGeom>
-        </p:spPr>
-        <p:style>
-          <a:lnRef idx="2">
-            <a:schemeClr val="accent1">
-              <a:shade val="50000"/>
-            </a:schemeClr>
-          </a:lnRef>
-          <a:fillRef idx="1">
-            <a:schemeClr val="accent1"/>
-          </a:fillRef>
-          <a:effectRef idx="0">
-            <a:schemeClr val="accent1"/>
-          </a:effectRef>
-          <a:fontRef idx="minor">
-            <a:schemeClr val="lt1"/>
-          </a:fontRef>
-        </p:style>
-        <p:txBody>
-          <a:bodyPr rtlCol="0" anchor="ctr"/>
-          <a:lstStyle/>
-          <a:p>
-            <a:pPr algn="ctr"/>
-            <a:r>
-              <a:rPr lang="fr-FR" sz="900" dirty="0"/>
-              <a:t>D5</a:t>
-            </a:r>
-          </a:p>
-        </p:txBody>
-      </p:sp>
-      <p:sp>
-        <p:nvSpPr>
-          <p:cNvPr id="51" name="Rectangle : coins arrondis 50">
-            <a:extLst>
-              <a:ext uri="{FF2B5EF4-FFF2-40B4-BE49-F238E27FC236}">
-                <a16:creationId xmlns:a16="http://schemas.microsoft.com/office/drawing/2014/main" id="{72A775AE-9826-3F6A-5704-83BE540566F3}"/>
-              </a:ext>
-            </a:extLst>
-          </p:cNvPr>
-          <p:cNvSpPr/>
-          <p:nvPr/>
-        </p:nvSpPr>
-        <p:spPr>
-          <a:xfrm>
-            <a:off x="1235161" y="2641344"/>
-            <a:ext cx="854593" cy="148656"/>
-          </a:xfrm>
-          <a:prstGeom prst="roundRect">
-            <a:avLst/>
-          </a:prstGeom>
-        </p:spPr>
-        <p:style>
-          <a:lnRef idx="2">
-            <a:schemeClr val="accent1">
-              <a:shade val="50000"/>
-            </a:schemeClr>
-          </a:lnRef>
-          <a:fillRef idx="1">
-            <a:schemeClr val="accent1"/>
-          </a:fillRef>
-          <a:effectRef idx="0">
-            <a:schemeClr val="accent1"/>
-          </a:effectRef>
-          <a:fontRef idx="minor">
-            <a:schemeClr val="lt1"/>
-          </a:fontRef>
-        </p:style>
-        <p:txBody>
-          <a:bodyPr rtlCol="0" anchor="ctr"/>
-          <a:lstStyle/>
-          <a:p>
-            <a:pPr algn="ctr"/>
-            <a:r>
-              <a:rPr lang="fr-FR" sz="900" dirty="0"/>
-              <a:t>D4</a:t>
-            </a:r>
-          </a:p>
-        </p:txBody>
-      </p:sp>
-      <p:sp>
-        <p:nvSpPr>
-          <p:cNvPr id="80" name="Rectangle : coins arrondis 79">
-            <a:extLst>
-              <a:ext uri="{FF2B5EF4-FFF2-40B4-BE49-F238E27FC236}">
-                <a16:creationId xmlns:a16="http://schemas.microsoft.com/office/drawing/2014/main" id="{8E2954F3-F04B-E2CF-FE92-D6B93CF724A9}"/>
-              </a:ext>
-            </a:extLst>
-          </p:cNvPr>
-          <p:cNvSpPr/>
-          <p:nvPr/>
-        </p:nvSpPr>
-        <p:spPr>
-          <a:xfrm>
-            <a:off x="2564260" y="2253985"/>
-            <a:ext cx="772357" cy="148656"/>
-          </a:xfrm>
-          <a:prstGeom prst="roundRect">
-            <a:avLst/>
-          </a:prstGeom>
-          <a:solidFill>
-            <a:schemeClr val="accent2"/>
-          </a:solidFill>
-        </p:spPr>
-        <p:style>
-          <a:lnRef idx="2">
-            <a:schemeClr val="accent1">
-              <a:shade val="50000"/>
-            </a:schemeClr>
-          </a:lnRef>
-          <a:fillRef idx="1">
-            <a:schemeClr val="accent1"/>
-          </a:fillRef>
-          <a:effectRef idx="0">
-            <a:schemeClr val="accent1"/>
-          </a:effectRef>
-          <a:fontRef idx="minor">
-            <a:schemeClr val="lt1"/>
-          </a:fontRef>
-        </p:style>
-        <p:txBody>
-          <a:bodyPr rtlCol="0" anchor="ctr"/>
-          <a:lstStyle/>
-          <a:p>
-            <a:pPr algn="ctr"/>
-            <a:r>
-              <a:rPr lang="fr-FR" sz="1100" dirty="0"/>
-              <a:t>enable</a:t>
-            </a:r>
-          </a:p>
-        </p:txBody>
-      </p:sp>
-      <p:sp>
-        <p:nvSpPr>
-          <p:cNvPr id="81" name="Rectangle : coins arrondis 80">
-            <a:extLst>
-              <a:ext uri="{FF2B5EF4-FFF2-40B4-BE49-F238E27FC236}">
-                <a16:creationId xmlns:a16="http://schemas.microsoft.com/office/drawing/2014/main" id="{02A07AAE-AEA0-071D-46E2-9A44905820D1}"/>
-              </a:ext>
-            </a:extLst>
-          </p:cNvPr>
-          <p:cNvSpPr/>
-          <p:nvPr/>
-        </p:nvSpPr>
-        <p:spPr>
-          <a:xfrm>
-            <a:off x="2564260" y="2450747"/>
-            <a:ext cx="772357" cy="148656"/>
-          </a:xfrm>
-          <a:prstGeom prst="roundRect">
-            <a:avLst/>
-          </a:prstGeom>
-          <a:solidFill>
-            <a:schemeClr val="accent2"/>
-          </a:solidFill>
-        </p:spPr>
-        <p:style>
-          <a:lnRef idx="2">
-            <a:schemeClr val="accent1">
-              <a:shade val="50000"/>
-            </a:schemeClr>
-          </a:lnRef>
-          <a:fillRef idx="1">
-            <a:schemeClr val="accent1"/>
-          </a:fillRef>
-          <a:effectRef idx="0">
-            <a:schemeClr val="accent1"/>
-          </a:effectRef>
-          <a:fontRef idx="minor">
-            <a:schemeClr val="lt1"/>
-          </a:fontRef>
-        </p:style>
-        <p:txBody>
-          <a:bodyPr rtlCol="0" anchor="ctr"/>
-          <a:lstStyle/>
-          <a:p>
-            <a:pPr algn="ctr"/>
-            <a:r>
-              <a:rPr lang="fr-FR" sz="1100" dirty="0" err="1"/>
-              <a:t>out_S</a:t>
-            </a:r>
-            <a:endParaRPr lang="fr-FR" sz="1100" dirty="0"/>
-          </a:p>
-        </p:txBody>
-      </p:sp>
-      <p:sp>
-        <p:nvSpPr>
-          <p:cNvPr id="82" name="Rectangle : coins arrondis 81">
-            <a:extLst>
-              <a:ext uri="{FF2B5EF4-FFF2-40B4-BE49-F238E27FC236}">
-                <a16:creationId xmlns:a16="http://schemas.microsoft.com/office/drawing/2014/main" id="{E0E7CFEE-6465-A389-EBDA-ECD8F00EF584}"/>
-              </a:ext>
-            </a:extLst>
-          </p:cNvPr>
-          <p:cNvSpPr/>
-          <p:nvPr/>
-        </p:nvSpPr>
-        <p:spPr>
-          <a:xfrm>
-            <a:off x="2572961" y="2646317"/>
-            <a:ext cx="772357" cy="148656"/>
-          </a:xfrm>
-          <a:prstGeom prst="roundRect">
-            <a:avLst/>
-          </a:prstGeom>
-          <a:solidFill>
-            <a:schemeClr val="accent2"/>
-          </a:solidFill>
-        </p:spPr>
-        <p:style>
-          <a:lnRef idx="2">
-            <a:schemeClr val="accent1">
-              <a:shade val="50000"/>
-            </a:schemeClr>
-          </a:lnRef>
-          <a:fillRef idx="1">
-            <a:schemeClr val="accent1"/>
-          </a:fillRef>
-          <a:effectRef idx="0">
-            <a:schemeClr val="accent1"/>
-          </a:effectRef>
-          <a:fontRef idx="minor">
-            <a:schemeClr val="lt1"/>
-          </a:fontRef>
-        </p:style>
-        <p:txBody>
-          <a:bodyPr rtlCol="0" anchor="ctr"/>
-          <a:lstStyle/>
-          <a:p>
-            <a:pPr algn="ctr"/>
-            <a:r>
-              <a:rPr lang="fr-FR" sz="1100" dirty="0"/>
-              <a:t>start</a:t>
-            </a:r>
-          </a:p>
-        </p:txBody>
-      </p:sp>
-      <p:sp>
-        <p:nvSpPr>
-          <p:cNvPr id="83" name="Rectangle : coins arrondis 82">
-            <a:extLst>
-              <a:ext uri="{FF2B5EF4-FFF2-40B4-BE49-F238E27FC236}">
-                <a16:creationId xmlns:a16="http://schemas.microsoft.com/office/drawing/2014/main" id="{AB2CB8CB-181F-950A-DEA0-1526C1B770D1}"/>
-              </a:ext>
-            </a:extLst>
-          </p:cNvPr>
-          <p:cNvSpPr/>
-          <p:nvPr/>
-        </p:nvSpPr>
-        <p:spPr>
-          <a:xfrm>
-            <a:off x="1235160" y="2024708"/>
-            <a:ext cx="854593" cy="148656"/>
-          </a:xfrm>
-          <a:prstGeom prst="roundRect">
-            <a:avLst/>
-          </a:prstGeom>
-        </p:spPr>
-        <p:style>
-          <a:lnRef idx="2">
-            <a:schemeClr val="accent1">
-              <a:shade val="50000"/>
-            </a:schemeClr>
-          </a:lnRef>
-          <a:fillRef idx="1">
-            <a:schemeClr val="accent1"/>
-          </a:fillRef>
-          <a:effectRef idx="0">
-            <a:schemeClr val="accent1"/>
-          </a:effectRef>
-          <a:fontRef idx="minor">
-            <a:schemeClr val="lt1"/>
-          </a:fontRef>
-        </p:style>
-        <p:txBody>
-          <a:bodyPr rtlCol="0" anchor="ctr"/>
-          <a:lstStyle/>
-          <a:p>
-            <a:pPr algn="ctr"/>
-            <a:r>
-              <a:rPr lang="fr-FR" sz="900" dirty="0"/>
-              <a:t>PA_1 / RX</a:t>
-            </a:r>
-          </a:p>
-        </p:txBody>
-      </p:sp>
-      <p:sp>
-        <p:nvSpPr>
-          <p:cNvPr id="84" name="Rectangle : coins arrondis 83">
-            <a:extLst>
-              <a:ext uri="{FF2B5EF4-FFF2-40B4-BE49-F238E27FC236}">
-                <a16:creationId xmlns:a16="http://schemas.microsoft.com/office/drawing/2014/main" id="{2DD3E401-AB1F-ED93-80C2-302ADC1B7CE5}"/>
-              </a:ext>
-            </a:extLst>
-          </p:cNvPr>
-          <p:cNvSpPr/>
-          <p:nvPr/>
-        </p:nvSpPr>
-        <p:spPr>
-          <a:xfrm rot="5400000">
-            <a:off x="2778799" y="1809810"/>
-            <a:ext cx="164100" cy="563008"/>
-          </a:xfrm>
-          <a:prstGeom prst="roundRect">
-            <a:avLst/>
-          </a:prstGeom>
-          <a:solidFill>
-            <a:schemeClr val="bg1"/>
-          </a:solidFill>
-          <a:ln>
-            <a:solidFill>
-              <a:schemeClr val="tx1"/>
-            </a:solidFill>
-          </a:ln>
-        </p:spPr>
-        <p:style>
-          <a:lnRef idx="2">
-            <a:schemeClr val="accent1">
-              <a:shade val="50000"/>
-            </a:schemeClr>
-          </a:lnRef>
-          <a:fillRef idx="1">
-            <a:schemeClr val="accent1"/>
-          </a:fillRef>
-          <a:effectRef idx="0">
-            <a:schemeClr val="accent1"/>
-          </a:effectRef>
-          <a:fontRef idx="minor">
-            <a:schemeClr val="lt1"/>
-          </a:fontRef>
-        </p:style>
-        <p:txBody>
-          <a:bodyPr vert="vert270" rtlCol="0" anchor="ctr"/>
-          <a:lstStyle/>
-          <a:p>
-            <a:pPr algn="ctr"/>
-            <a:r>
-              <a:rPr lang="fr-FR" sz="700" dirty="0">
-                <a:solidFill>
-                  <a:schemeClr val="tx1"/>
-                </a:solidFill>
-              </a:rPr>
-              <a:t>NOT USED</a:t>
-            </a:r>
-          </a:p>
-        </p:txBody>
-      </p:sp>
-      <p:sp>
-        <p:nvSpPr>
-          <p:cNvPr id="7" name="ZoneTexte 6">
-            <a:extLst>
-              <a:ext uri="{FF2B5EF4-FFF2-40B4-BE49-F238E27FC236}">
-                <a16:creationId xmlns:a16="http://schemas.microsoft.com/office/drawing/2014/main" id="{F250573B-71F8-A1EA-44EF-242D6BC289F5}"/>
-              </a:ext>
-            </a:extLst>
-          </p:cNvPr>
-          <p:cNvSpPr txBox="1"/>
-          <p:nvPr/>
-        </p:nvSpPr>
-        <p:spPr>
-          <a:xfrm rot="20541721">
-            <a:off x="1383567" y="3631443"/>
-            <a:ext cx="9174048" cy="1107996"/>
-          </a:xfrm>
-          <a:prstGeom prst="rect">
-            <a:avLst/>
-          </a:prstGeom>
-          <a:noFill/>
-        </p:spPr>
-        <p:txBody>
-          <a:bodyPr wrap="square" rtlCol="0">
-            <a:spAutoFit/>
-          </a:bodyPr>
-          <a:lstStyle/>
-          <a:p>
-            <a:pPr algn="ctr"/>
-            <a:r>
-              <a:rPr lang="fr-FR" sz="6600" dirty="0">
-                <a:solidFill>
-                  <a:schemeClr val="bg1">
-                    <a:lumMod val="50000"/>
-                  </a:schemeClr>
-                </a:solidFill>
-              </a:rPr>
-              <a:t>NE PAS UTILISER !!!!</a:t>
-            </a:r>
-          </a:p>
-        </p:txBody>
-      </p:sp>
-    </p:spTree>
-    <p:extLst>
-      <p:ext uri="{BB962C8B-B14F-4D97-AF65-F5344CB8AC3E}">
-        <p14:creationId xmlns:p14="http://schemas.microsoft.com/office/powerpoint/2010/main" val="2882775853"/>
       </p:ext>
     </p:extLst>
   </p:cSld>

</xml_diff>